<commit_message>
updated ppt that accompanies pa3
</commit_message>
<xml_diff>
--- a/homework/pa3/maps.pptx
+++ b/homework/pa3/maps.pptx
@@ -7,6 +7,9 @@
   <p:sldIdLst>
     <p:sldId id="256" r:id="rId2"/>
     <p:sldId id="257" r:id="rId3"/>
+    <p:sldId id="258" r:id="rId4"/>
+    <p:sldId id="259" r:id="rId5"/>
+    <p:sldId id="260" r:id="rId6"/>
   </p:sldIdLst>
   <p:sldSz cx="12192000" cy="6858000"/>
   <p:notesSz cx="6858000" cy="9144000"/>
@@ -5048,10 +5051,2669 @@
           </a:fontRef>
         </p:style>
       </p:cxnSp>
+      <p:sp>
+        <p:nvSpPr>
+          <p:cNvPr id="50" name="TextBox 49">
+            <a:extLst>
+              <a:ext uri="{FF2B5EF4-FFF2-40B4-BE49-F238E27FC236}">
+                <a16:creationId xmlns:a16="http://schemas.microsoft.com/office/drawing/2014/main" id="{E7370BB2-EB94-48CD-A3FC-3CC679AEE6FA}"/>
+              </a:ext>
+            </a:extLst>
+          </p:cNvPr>
+          <p:cNvSpPr txBox="1"/>
+          <p:nvPr/>
+        </p:nvSpPr>
+        <p:spPr>
+          <a:xfrm>
+            <a:off x="4354772" y="967719"/>
+            <a:ext cx="301686" cy="369332"/>
+          </a:xfrm>
+          <a:prstGeom prst="rect">
+            <a:avLst/>
+          </a:prstGeom>
+          <a:noFill/>
+        </p:spPr>
+        <p:txBody>
+          <a:bodyPr wrap="none" rtlCol="0">
+            <a:spAutoFit/>
+          </a:bodyPr>
+          <a:lstStyle/>
+          <a:p>
+            <a:r>
+              <a:rPr lang="en-US" dirty="0"/>
+              <a:t>5</a:t>
+            </a:r>
+          </a:p>
+        </p:txBody>
+      </p:sp>
+      <p:sp>
+        <p:nvSpPr>
+          <p:cNvPr id="51" name="TextBox 50">
+            <a:extLst>
+              <a:ext uri="{FF2B5EF4-FFF2-40B4-BE49-F238E27FC236}">
+                <a16:creationId xmlns:a16="http://schemas.microsoft.com/office/drawing/2014/main" id="{DA6F015F-1E76-48A4-9FDF-145D85285A82}"/>
+              </a:ext>
+            </a:extLst>
+          </p:cNvPr>
+          <p:cNvSpPr txBox="1"/>
+          <p:nvPr/>
+        </p:nvSpPr>
+        <p:spPr>
+          <a:xfrm>
+            <a:off x="7275164" y="976689"/>
+            <a:ext cx="301686" cy="369332"/>
+          </a:xfrm>
+          <a:prstGeom prst="rect">
+            <a:avLst/>
+          </a:prstGeom>
+          <a:noFill/>
+        </p:spPr>
+        <p:txBody>
+          <a:bodyPr wrap="none" rtlCol="0">
+            <a:spAutoFit/>
+          </a:bodyPr>
+          <a:lstStyle/>
+          <a:p>
+            <a:r>
+              <a:rPr lang="en-US" dirty="0"/>
+              <a:t>1</a:t>
+            </a:r>
+          </a:p>
+        </p:txBody>
+      </p:sp>
+      <p:sp>
+        <p:nvSpPr>
+          <p:cNvPr id="52" name="TextBox 51">
+            <a:extLst>
+              <a:ext uri="{FF2B5EF4-FFF2-40B4-BE49-F238E27FC236}">
+                <a16:creationId xmlns:a16="http://schemas.microsoft.com/office/drawing/2014/main" id="{A4B1D51E-A557-4B30-B942-65A20A786F78}"/>
+              </a:ext>
+            </a:extLst>
+          </p:cNvPr>
+          <p:cNvSpPr txBox="1"/>
+          <p:nvPr/>
+        </p:nvSpPr>
+        <p:spPr>
+          <a:xfrm>
+            <a:off x="8914817" y="2046911"/>
+            <a:ext cx="301686" cy="369332"/>
+          </a:xfrm>
+          <a:prstGeom prst="rect">
+            <a:avLst/>
+          </a:prstGeom>
+          <a:noFill/>
+        </p:spPr>
+        <p:txBody>
+          <a:bodyPr wrap="none" rtlCol="0">
+            <a:spAutoFit/>
+          </a:bodyPr>
+          <a:lstStyle/>
+          <a:p>
+            <a:r>
+              <a:rPr lang="en-US" dirty="0"/>
+              <a:t>3</a:t>
+            </a:r>
+          </a:p>
+        </p:txBody>
+      </p:sp>
+      <p:sp>
+        <p:nvSpPr>
+          <p:cNvPr id="53" name="TextBox 52">
+            <a:extLst>
+              <a:ext uri="{FF2B5EF4-FFF2-40B4-BE49-F238E27FC236}">
+                <a16:creationId xmlns:a16="http://schemas.microsoft.com/office/drawing/2014/main" id="{D061D6D0-09CC-464F-BA50-760F794E9EE6}"/>
+              </a:ext>
+            </a:extLst>
+          </p:cNvPr>
+          <p:cNvSpPr txBox="1"/>
+          <p:nvPr/>
+        </p:nvSpPr>
+        <p:spPr>
+          <a:xfrm>
+            <a:off x="8914817" y="3849588"/>
+            <a:ext cx="301686" cy="369332"/>
+          </a:xfrm>
+          <a:prstGeom prst="rect">
+            <a:avLst/>
+          </a:prstGeom>
+          <a:noFill/>
+        </p:spPr>
+        <p:txBody>
+          <a:bodyPr wrap="none" rtlCol="0">
+            <a:spAutoFit/>
+          </a:bodyPr>
+          <a:lstStyle/>
+          <a:p>
+            <a:r>
+              <a:rPr lang="en-US" dirty="0"/>
+              <a:t>5</a:t>
+            </a:r>
+          </a:p>
+        </p:txBody>
+      </p:sp>
+      <p:sp>
+        <p:nvSpPr>
+          <p:cNvPr id="54" name="TextBox 53">
+            <a:extLst>
+              <a:ext uri="{FF2B5EF4-FFF2-40B4-BE49-F238E27FC236}">
+                <a16:creationId xmlns:a16="http://schemas.microsoft.com/office/drawing/2014/main" id="{6A82F625-343A-4B5A-9C62-F85C22AEC046}"/>
+              </a:ext>
+            </a:extLst>
+          </p:cNvPr>
+          <p:cNvSpPr txBox="1"/>
+          <p:nvPr/>
+        </p:nvSpPr>
+        <p:spPr>
+          <a:xfrm>
+            <a:off x="7254361" y="3785812"/>
+            <a:ext cx="301686" cy="369332"/>
+          </a:xfrm>
+          <a:prstGeom prst="rect">
+            <a:avLst/>
+          </a:prstGeom>
+          <a:noFill/>
+        </p:spPr>
+        <p:txBody>
+          <a:bodyPr wrap="none" rtlCol="0">
+            <a:spAutoFit/>
+          </a:bodyPr>
+          <a:lstStyle/>
+          <a:p>
+            <a:r>
+              <a:rPr lang="en-US" dirty="0"/>
+              <a:t>5</a:t>
+            </a:r>
+          </a:p>
+        </p:txBody>
+      </p:sp>
+      <p:sp>
+        <p:nvSpPr>
+          <p:cNvPr id="55" name="TextBox 54">
+            <a:extLst>
+              <a:ext uri="{FF2B5EF4-FFF2-40B4-BE49-F238E27FC236}">
+                <a16:creationId xmlns:a16="http://schemas.microsoft.com/office/drawing/2014/main" id="{FB9DB96F-0314-4195-B0DC-579C05AAD0E3}"/>
+              </a:ext>
+            </a:extLst>
+          </p:cNvPr>
+          <p:cNvSpPr txBox="1"/>
+          <p:nvPr/>
+        </p:nvSpPr>
+        <p:spPr>
+          <a:xfrm>
+            <a:off x="7254361" y="2752460"/>
+            <a:ext cx="301686" cy="369332"/>
+          </a:xfrm>
+          <a:prstGeom prst="rect">
+            <a:avLst/>
+          </a:prstGeom>
+          <a:noFill/>
+        </p:spPr>
+        <p:txBody>
+          <a:bodyPr wrap="none" rtlCol="0">
+            <a:spAutoFit/>
+          </a:bodyPr>
+          <a:lstStyle/>
+          <a:p>
+            <a:r>
+              <a:rPr lang="en-US" dirty="0"/>
+              <a:t>3</a:t>
+            </a:r>
+          </a:p>
+        </p:txBody>
+      </p:sp>
+      <p:sp>
+        <p:nvSpPr>
+          <p:cNvPr id="56" name="TextBox 55">
+            <a:extLst>
+              <a:ext uri="{FF2B5EF4-FFF2-40B4-BE49-F238E27FC236}">
+                <a16:creationId xmlns:a16="http://schemas.microsoft.com/office/drawing/2014/main" id="{289F8255-AA81-427C-9FA5-939EF677F9A6}"/>
+              </a:ext>
+            </a:extLst>
+          </p:cNvPr>
+          <p:cNvSpPr txBox="1"/>
+          <p:nvPr/>
+        </p:nvSpPr>
+        <p:spPr>
+          <a:xfrm>
+            <a:off x="5794707" y="1998052"/>
+            <a:ext cx="301686" cy="369332"/>
+          </a:xfrm>
+          <a:prstGeom prst="rect">
+            <a:avLst/>
+          </a:prstGeom>
+          <a:noFill/>
+        </p:spPr>
+        <p:txBody>
+          <a:bodyPr wrap="none" rtlCol="0">
+            <a:spAutoFit/>
+          </a:bodyPr>
+          <a:lstStyle/>
+          <a:p>
+            <a:r>
+              <a:rPr lang="en-US" dirty="0"/>
+              <a:t>4</a:t>
+            </a:r>
+          </a:p>
+        </p:txBody>
+      </p:sp>
+      <p:sp>
+        <p:nvSpPr>
+          <p:cNvPr id="57" name="TextBox 56">
+            <a:extLst>
+              <a:ext uri="{FF2B5EF4-FFF2-40B4-BE49-F238E27FC236}">
+                <a16:creationId xmlns:a16="http://schemas.microsoft.com/office/drawing/2014/main" id="{643E6EF6-CE62-4BBF-A0A2-5CE0341037C4}"/>
+              </a:ext>
+            </a:extLst>
+          </p:cNvPr>
+          <p:cNvSpPr txBox="1"/>
+          <p:nvPr/>
+        </p:nvSpPr>
+        <p:spPr>
+          <a:xfrm>
+            <a:off x="4350575" y="1998052"/>
+            <a:ext cx="301686" cy="369332"/>
+          </a:xfrm>
+          <a:prstGeom prst="rect">
+            <a:avLst/>
+          </a:prstGeom>
+          <a:noFill/>
+        </p:spPr>
+        <p:txBody>
+          <a:bodyPr wrap="none" rtlCol="0">
+            <a:spAutoFit/>
+          </a:bodyPr>
+          <a:lstStyle/>
+          <a:p>
+            <a:r>
+              <a:rPr lang="en-US" dirty="0"/>
+              <a:t>2</a:t>
+            </a:r>
+          </a:p>
+        </p:txBody>
+      </p:sp>
+      <p:sp>
+        <p:nvSpPr>
+          <p:cNvPr id="58" name="TextBox 57">
+            <a:extLst>
+              <a:ext uri="{FF2B5EF4-FFF2-40B4-BE49-F238E27FC236}">
+                <a16:creationId xmlns:a16="http://schemas.microsoft.com/office/drawing/2014/main" id="{3EBDC43F-C8D9-47FA-9BBB-572FD161063E}"/>
+              </a:ext>
+            </a:extLst>
+          </p:cNvPr>
+          <p:cNvSpPr txBox="1"/>
+          <p:nvPr/>
+        </p:nvSpPr>
+        <p:spPr>
+          <a:xfrm>
+            <a:off x="2929733" y="2115895"/>
+            <a:ext cx="301686" cy="369332"/>
+          </a:xfrm>
+          <a:prstGeom prst="rect">
+            <a:avLst/>
+          </a:prstGeom>
+          <a:noFill/>
+        </p:spPr>
+        <p:txBody>
+          <a:bodyPr wrap="none" rtlCol="0">
+            <a:spAutoFit/>
+          </a:bodyPr>
+          <a:lstStyle/>
+          <a:p>
+            <a:r>
+              <a:rPr lang="en-US" dirty="0"/>
+              <a:t>5</a:t>
+            </a:r>
+          </a:p>
+        </p:txBody>
+      </p:sp>
+      <p:sp>
+        <p:nvSpPr>
+          <p:cNvPr id="59" name="TextBox 58">
+            <a:extLst>
+              <a:ext uri="{FF2B5EF4-FFF2-40B4-BE49-F238E27FC236}">
+                <a16:creationId xmlns:a16="http://schemas.microsoft.com/office/drawing/2014/main" id="{13FA8ACB-59E2-4DD2-B2DB-B84D658A65A0}"/>
+              </a:ext>
+            </a:extLst>
+          </p:cNvPr>
+          <p:cNvSpPr txBox="1"/>
+          <p:nvPr/>
+        </p:nvSpPr>
+        <p:spPr>
+          <a:xfrm>
+            <a:off x="2909094" y="3849588"/>
+            <a:ext cx="301686" cy="369332"/>
+          </a:xfrm>
+          <a:prstGeom prst="rect">
+            <a:avLst/>
+          </a:prstGeom>
+          <a:noFill/>
+        </p:spPr>
+        <p:txBody>
+          <a:bodyPr wrap="none" rtlCol="0">
+            <a:spAutoFit/>
+          </a:bodyPr>
+          <a:lstStyle/>
+          <a:p>
+            <a:r>
+              <a:rPr lang="en-US" dirty="0"/>
+              <a:t>4</a:t>
+            </a:r>
+          </a:p>
+        </p:txBody>
+      </p:sp>
+      <p:sp>
+        <p:nvSpPr>
+          <p:cNvPr id="60" name="TextBox 59">
+            <a:extLst>
+              <a:ext uri="{FF2B5EF4-FFF2-40B4-BE49-F238E27FC236}">
+                <a16:creationId xmlns:a16="http://schemas.microsoft.com/office/drawing/2014/main" id="{6B1EDC0D-3AB1-4845-B931-D32858A4279D}"/>
+              </a:ext>
+            </a:extLst>
+          </p:cNvPr>
+          <p:cNvSpPr txBox="1"/>
+          <p:nvPr/>
+        </p:nvSpPr>
+        <p:spPr>
+          <a:xfrm>
+            <a:off x="4234933" y="3664922"/>
+            <a:ext cx="301686" cy="369332"/>
+          </a:xfrm>
+          <a:prstGeom prst="rect">
+            <a:avLst/>
+          </a:prstGeom>
+          <a:noFill/>
+        </p:spPr>
+        <p:txBody>
+          <a:bodyPr wrap="none" rtlCol="0">
+            <a:spAutoFit/>
+          </a:bodyPr>
+          <a:lstStyle/>
+          <a:p>
+            <a:r>
+              <a:rPr lang="en-US" dirty="0"/>
+              <a:t>6</a:t>
+            </a:r>
+          </a:p>
+        </p:txBody>
+      </p:sp>
+      <p:sp>
+        <p:nvSpPr>
+          <p:cNvPr id="61" name="TextBox 60">
+            <a:extLst>
+              <a:ext uri="{FF2B5EF4-FFF2-40B4-BE49-F238E27FC236}">
+                <a16:creationId xmlns:a16="http://schemas.microsoft.com/office/drawing/2014/main" id="{70848D18-14D6-403D-A7AE-E0F3C524EF63}"/>
+              </a:ext>
+            </a:extLst>
+          </p:cNvPr>
+          <p:cNvSpPr txBox="1"/>
+          <p:nvPr/>
+        </p:nvSpPr>
+        <p:spPr>
+          <a:xfrm>
+            <a:off x="5794707" y="3913989"/>
+            <a:ext cx="301686" cy="369332"/>
+          </a:xfrm>
+          <a:prstGeom prst="rect">
+            <a:avLst/>
+          </a:prstGeom>
+          <a:noFill/>
+        </p:spPr>
+        <p:txBody>
+          <a:bodyPr wrap="none" rtlCol="0">
+            <a:spAutoFit/>
+          </a:bodyPr>
+          <a:lstStyle/>
+          <a:p>
+            <a:r>
+              <a:rPr lang="en-US" dirty="0"/>
+              <a:t>3</a:t>
+            </a:r>
+          </a:p>
+        </p:txBody>
+      </p:sp>
+      <p:sp>
+        <p:nvSpPr>
+          <p:cNvPr id="62" name="TextBox 61">
+            <a:extLst>
+              <a:ext uri="{FF2B5EF4-FFF2-40B4-BE49-F238E27FC236}">
+                <a16:creationId xmlns:a16="http://schemas.microsoft.com/office/drawing/2014/main" id="{D5616115-D377-40CC-BB32-1CEBF8251502}"/>
+              </a:ext>
+            </a:extLst>
+          </p:cNvPr>
+          <p:cNvSpPr txBox="1"/>
+          <p:nvPr/>
+        </p:nvSpPr>
+        <p:spPr>
+          <a:xfrm>
+            <a:off x="4585240" y="4707232"/>
+            <a:ext cx="301686" cy="369332"/>
+          </a:xfrm>
+          <a:prstGeom prst="rect">
+            <a:avLst/>
+          </a:prstGeom>
+          <a:noFill/>
+        </p:spPr>
+        <p:txBody>
+          <a:bodyPr wrap="none" rtlCol="0">
+            <a:spAutoFit/>
+          </a:bodyPr>
+          <a:lstStyle/>
+          <a:p>
+            <a:r>
+              <a:rPr lang="en-US" dirty="0"/>
+              <a:t>5</a:t>
+            </a:r>
+          </a:p>
+        </p:txBody>
+      </p:sp>
+      <p:sp>
+        <p:nvSpPr>
+          <p:cNvPr id="63" name="TextBox 62">
+            <a:extLst>
+              <a:ext uri="{FF2B5EF4-FFF2-40B4-BE49-F238E27FC236}">
+                <a16:creationId xmlns:a16="http://schemas.microsoft.com/office/drawing/2014/main" id="{311D65A7-5F2E-4387-B984-15D1CD2E3CB4}"/>
+              </a:ext>
+            </a:extLst>
+          </p:cNvPr>
+          <p:cNvSpPr txBox="1"/>
+          <p:nvPr/>
+        </p:nvSpPr>
+        <p:spPr>
+          <a:xfrm>
+            <a:off x="6973478" y="4715181"/>
+            <a:ext cx="301686" cy="369332"/>
+          </a:xfrm>
+          <a:prstGeom prst="rect">
+            <a:avLst/>
+          </a:prstGeom>
+          <a:noFill/>
+        </p:spPr>
+        <p:txBody>
+          <a:bodyPr wrap="none" rtlCol="0">
+            <a:spAutoFit/>
+          </a:bodyPr>
+          <a:lstStyle/>
+          <a:p>
+            <a:r>
+              <a:rPr lang="en-US" dirty="0"/>
+              <a:t>6</a:t>
+            </a:r>
+          </a:p>
+        </p:txBody>
+      </p:sp>
     </p:spTree>
     <p:extLst>
       <p:ext uri="{BB962C8B-B14F-4D97-AF65-F5344CB8AC3E}">
         <p14:creationId xmlns:p14="http://schemas.microsoft.com/office/powerpoint/2010/main" val="283390155"/>
+      </p:ext>
+    </p:extLst>
+  </p:cSld>
+  <p:clrMapOvr>
+    <a:masterClrMapping/>
+  </p:clrMapOvr>
+</p:sld>
+</file>
+
+<file path=ppt/slides/slide3.xml><?xml version="1.0" encoding="utf-8"?>
+<p:sld xmlns:a="http://schemas.openxmlformats.org/drawingml/2006/main" xmlns:r="http://schemas.openxmlformats.org/officeDocument/2006/relationships" xmlns:p="http://schemas.openxmlformats.org/presentationml/2006/main">
+  <p:cSld>
+    <p:spTree>
+      <p:nvGrpSpPr>
+        <p:cNvPr id="1" name=""/>
+        <p:cNvGrpSpPr/>
+        <p:nvPr/>
+      </p:nvGrpSpPr>
+      <p:grpSpPr>
+        <a:xfrm>
+          <a:off x="0" y="0"/>
+          <a:ext cx="0" cy="0"/>
+          <a:chOff x="0" y="0"/>
+          <a:chExt cx="0" cy="0"/>
+        </a:xfrm>
+      </p:grpSpPr>
+      <p:sp>
+        <p:nvSpPr>
+          <p:cNvPr id="2" name="Oval 1">
+            <a:extLst>
+              <a:ext uri="{FF2B5EF4-FFF2-40B4-BE49-F238E27FC236}">
+                <a16:creationId xmlns:a16="http://schemas.microsoft.com/office/drawing/2014/main" id="{8149D9A1-4580-48C3-92A0-3C20B034CD93}"/>
+              </a:ext>
+            </a:extLst>
+          </p:cNvPr>
+          <p:cNvSpPr/>
+          <p:nvPr/>
+        </p:nvSpPr>
+        <p:spPr>
+          <a:xfrm>
+            <a:off x="2509934" y="961052"/>
+            <a:ext cx="821095" cy="807634"/>
+          </a:xfrm>
+          <a:prstGeom prst="ellipse">
+            <a:avLst/>
+          </a:prstGeom>
+          <a:noFill/>
+          <a:ln w="38100">
+            <a:solidFill>
+              <a:schemeClr val="tx1"/>
+            </a:solidFill>
+          </a:ln>
+        </p:spPr>
+        <p:style>
+          <a:lnRef idx="2">
+            <a:schemeClr val="accent1">
+              <a:shade val="50000"/>
+            </a:schemeClr>
+          </a:lnRef>
+          <a:fillRef idx="1">
+            <a:schemeClr val="accent1"/>
+          </a:fillRef>
+          <a:effectRef idx="0">
+            <a:schemeClr val="accent1"/>
+          </a:effectRef>
+          <a:fontRef idx="minor">
+            <a:schemeClr val="lt1"/>
+          </a:fontRef>
+        </p:style>
+        <p:txBody>
+          <a:bodyPr rtlCol="0" anchor="ctr"/>
+          <a:lstStyle/>
+          <a:p>
+            <a:pPr algn="ctr"/>
+            <a:r>
+              <a:rPr lang="en-US" dirty="0">
+                <a:solidFill>
+                  <a:schemeClr val="tx1"/>
+                </a:solidFill>
+              </a:rPr>
+              <a:t>A</a:t>
+            </a:r>
+          </a:p>
+        </p:txBody>
+      </p:sp>
+      <p:sp>
+        <p:nvSpPr>
+          <p:cNvPr id="3" name="Oval 2">
+            <a:extLst>
+              <a:ext uri="{FF2B5EF4-FFF2-40B4-BE49-F238E27FC236}">
+                <a16:creationId xmlns:a16="http://schemas.microsoft.com/office/drawing/2014/main" id="{4A1E9B35-6398-4877-A846-BC056CB2CA10}"/>
+              </a:ext>
+            </a:extLst>
+          </p:cNvPr>
+          <p:cNvSpPr/>
+          <p:nvPr/>
+        </p:nvSpPr>
+        <p:spPr>
+          <a:xfrm>
+            <a:off x="5378518" y="924613"/>
+            <a:ext cx="821095" cy="807634"/>
+          </a:xfrm>
+          <a:prstGeom prst="ellipse">
+            <a:avLst/>
+          </a:prstGeom>
+          <a:noFill/>
+          <a:ln w="38100">
+            <a:solidFill>
+              <a:schemeClr val="tx1"/>
+            </a:solidFill>
+          </a:ln>
+        </p:spPr>
+        <p:style>
+          <a:lnRef idx="2">
+            <a:schemeClr val="accent1">
+              <a:shade val="50000"/>
+            </a:schemeClr>
+          </a:lnRef>
+          <a:fillRef idx="1">
+            <a:schemeClr val="accent1"/>
+          </a:fillRef>
+          <a:effectRef idx="0">
+            <a:schemeClr val="accent1"/>
+          </a:effectRef>
+          <a:fontRef idx="minor">
+            <a:schemeClr val="lt1"/>
+          </a:fontRef>
+        </p:style>
+        <p:txBody>
+          <a:bodyPr rtlCol="0" anchor="ctr"/>
+          <a:lstStyle/>
+          <a:p>
+            <a:pPr algn="ctr"/>
+            <a:r>
+              <a:rPr lang="en-US" dirty="0">
+                <a:solidFill>
+                  <a:schemeClr val="tx1"/>
+                </a:solidFill>
+              </a:rPr>
+              <a:t>B</a:t>
+            </a:r>
+          </a:p>
+        </p:txBody>
+      </p:sp>
+      <p:sp>
+        <p:nvSpPr>
+          <p:cNvPr id="5" name="Oval 4">
+            <a:extLst>
+              <a:ext uri="{FF2B5EF4-FFF2-40B4-BE49-F238E27FC236}">
+                <a16:creationId xmlns:a16="http://schemas.microsoft.com/office/drawing/2014/main" id="{027B5F2A-D43A-4A38-AED8-5CC9C00F1585}"/>
+              </a:ext>
+            </a:extLst>
+          </p:cNvPr>
+          <p:cNvSpPr/>
+          <p:nvPr/>
+        </p:nvSpPr>
+        <p:spPr>
+          <a:xfrm>
+            <a:off x="2509933" y="2730907"/>
+            <a:ext cx="821095" cy="807634"/>
+          </a:xfrm>
+          <a:prstGeom prst="ellipse">
+            <a:avLst/>
+          </a:prstGeom>
+          <a:noFill/>
+          <a:ln w="38100">
+            <a:solidFill>
+              <a:schemeClr val="tx1"/>
+            </a:solidFill>
+          </a:ln>
+        </p:spPr>
+        <p:style>
+          <a:lnRef idx="2">
+            <a:schemeClr val="accent1">
+              <a:shade val="50000"/>
+            </a:schemeClr>
+          </a:lnRef>
+          <a:fillRef idx="1">
+            <a:schemeClr val="accent1"/>
+          </a:fillRef>
+          <a:effectRef idx="0">
+            <a:schemeClr val="accent1"/>
+          </a:effectRef>
+          <a:fontRef idx="minor">
+            <a:schemeClr val="lt1"/>
+          </a:fontRef>
+        </p:style>
+        <p:txBody>
+          <a:bodyPr rtlCol="0" anchor="ctr"/>
+          <a:lstStyle/>
+          <a:p>
+            <a:pPr algn="ctr"/>
+            <a:r>
+              <a:rPr lang="en-US" dirty="0">
+                <a:solidFill>
+                  <a:schemeClr val="tx1"/>
+                </a:solidFill>
+              </a:rPr>
+              <a:t>D</a:t>
+            </a:r>
+          </a:p>
+        </p:txBody>
+      </p:sp>
+      <p:sp>
+        <p:nvSpPr>
+          <p:cNvPr id="6" name="Oval 5">
+            <a:extLst>
+              <a:ext uri="{FF2B5EF4-FFF2-40B4-BE49-F238E27FC236}">
+                <a16:creationId xmlns:a16="http://schemas.microsoft.com/office/drawing/2014/main" id="{FA2AF5BC-3610-4EFC-B064-56C4326E870F}"/>
+              </a:ext>
+            </a:extLst>
+          </p:cNvPr>
+          <p:cNvSpPr/>
+          <p:nvPr/>
+        </p:nvSpPr>
+        <p:spPr>
+          <a:xfrm>
+            <a:off x="5378517" y="2730907"/>
+            <a:ext cx="821095" cy="807634"/>
+          </a:xfrm>
+          <a:prstGeom prst="ellipse">
+            <a:avLst/>
+          </a:prstGeom>
+          <a:noFill/>
+          <a:ln w="38100">
+            <a:solidFill>
+              <a:schemeClr val="tx1"/>
+            </a:solidFill>
+          </a:ln>
+        </p:spPr>
+        <p:style>
+          <a:lnRef idx="2">
+            <a:schemeClr val="accent1">
+              <a:shade val="50000"/>
+            </a:schemeClr>
+          </a:lnRef>
+          <a:fillRef idx="1">
+            <a:schemeClr val="accent1"/>
+          </a:fillRef>
+          <a:effectRef idx="0">
+            <a:schemeClr val="accent1"/>
+          </a:effectRef>
+          <a:fontRef idx="minor">
+            <a:schemeClr val="lt1"/>
+          </a:fontRef>
+        </p:style>
+        <p:txBody>
+          <a:bodyPr rtlCol="0" anchor="ctr"/>
+          <a:lstStyle/>
+          <a:p>
+            <a:pPr algn="ctr"/>
+            <a:r>
+              <a:rPr lang="en-US" dirty="0">
+                <a:solidFill>
+                  <a:schemeClr val="tx1"/>
+                </a:solidFill>
+              </a:rPr>
+              <a:t>E</a:t>
+            </a:r>
+          </a:p>
+        </p:txBody>
+      </p:sp>
+      <p:sp>
+        <p:nvSpPr>
+          <p:cNvPr id="14" name="Oval 13">
+            <a:extLst>
+              <a:ext uri="{FF2B5EF4-FFF2-40B4-BE49-F238E27FC236}">
+                <a16:creationId xmlns:a16="http://schemas.microsoft.com/office/drawing/2014/main" id="{FD26DF91-AA5B-41C9-98B8-1E1FE5DA81A4}"/>
+              </a:ext>
+            </a:extLst>
+          </p:cNvPr>
+          <p:cNvSpPr/>
+          <p:nvPr/>
+        </p:nvSpPr>
+        <p:spPr>
+          <a:xfrm>
+            <a:off x="8504273" y="924613"/>
+            <a:ext cx="821095" cy="807634"/>
+          </a:xfrm>
+          <a:prstGeom prst="ellipse">
+            <a:avLst/>
+          </a:prstGeom>
+          <a:noFill/>
+          <a:ln w="38100">
+            <a:solidFill>
+              <a:schemeClr val="tx1"/>
+            </a:solidFill>
+          </a:ln>
+        </p:spPr>
+        <p:style>
+          <a:lnRef idx="2">
+            <a:schemeClr val="accent1">
+              <a:shade val="50000"/>
+            </a:schemeClr>
+          </a:lnRef>
+          <a:fillRef idx="1">
+            <a:schemeClr val="accent1"/>
+          </a:fillRef>
+          <a:effectRef idx="0">
+            <a:schemeClr val="accent1"/>
+          </a:effectRef>
+          <a:fontRef idx="minor">
+            <a:schemeClr val="lt1"/>
+          </a:fontRef>
+        </p:style>
+        <p:txBody>
+          <a:bodyPr rtlCol="0" anchor="ctr"/>
+          <a:lstStyle/>
+          <a:p>
+            <a:pPr algn="ctr"/>
+            <a:r>
+              <a:rPr lang="en-US" dirty="0">
+                <a:solidFill>
+                  <a:schemeClr val="tx1"/>
+                </a:solidFill>
+              </a:rPr>
+              <a:t>C</a:t>
+            </a:r>
+          </a:p>
+        </p:txBody>
+      </p:sp>
+      <p:sp>
+        <p:nvSpPr>
+          <p:cNvPr id="21" name="Oval 20">
+            <a:extLst>
+              <a:ext uri="{FF2B5EF4-FFF2-40B4-BE49-F238E27FC236}">
+                <a16:creationId xmlns:a16="http://schemas.microsoft.com/office/drawing/2014/main" id="{5DCF0284-182F-4555-9BB2-915FD08196D7}"/>
+              </a:ext>
+            </a:extLst>
+          </p:cNvPr>
+          <p:cNvSpPr/>
+          <p:nvPr/>
+        </p:nvSpPr>
+        <p:spPr>
+          <a:xfrm>
+            <a:off x="8504272" y="2730907"/>
+            <a:ext cx="821095" cy="807634"/>
+          </a:xfrm>
+          <a:prstGeom prst="ellipse">
+            <a:avLst/>
+          </a:prstGeom>
+          <a:noFill/>
+          <a:ln w="38100">
+            <a:solidFill>
+              <a:schemeClr val="tx1"/>
+            </a:solidFill>
+          </a:ln>
+        </p:spPr>
+        <p:style>
+          <a:lnRef idx="2">
+            <a:schemeClr val="accent1">
+              <a:shade val="50000"/>
+            </a:schemeClr>
+          </a:lnRef>
+          <a:fillRef idx="1">
+            <a:schemeClr val="accent1"/>
+          </a:fillRef>
+          <a:effectRef idx="0">
+            <a:schemeClr val="accent1"/>
+          </a:effectRef>
+          <a:fontRef idx="minor">
+            <a:schemeClr val="lt1"/>
+          </a:fontRef>
+        </p:style>
+        <p:txBody>
+          <a:bodyPr rtlCol="0" anchor="ctr"/>
+          <a:lstStyle/>
+          <a:p>
+            <a:pPr algn="ctr"/>
+            <a:r>
+              <a:rPr lang="en-US" dirty="0">
+                <a:solidFill>
+                  <a:schemeClr val="tx1"/>
+                </a:solidFill>
+              </a:rPr>
+              <a:t>F</a:t>
+            </a:r>
+          </a:p>
+        </p:txBody>
+      </p:sp>
+      <p:sp>
+        <p:nvSpPr>
+          <p:cNvPr id="22" name="Oval 21">
+            <a:extLst>
+              <a:ext uri="{FF2B5EF4-FFF2-40B4-BE49-F238E27FC236}">
+                <a16:creationId xmlns:a16="http://schemas.microsoft.com/office/drawing/2014/main" id="{B310E9A9-DCE9-437B-9921-22DBF9CBE2FB}"/>
+              </a:ext>
+            </a:extLst>
+          </p:cNvPr>
+          <p:cNvSpPr/>
+          <p:nvPr/>
+        </p:nvSpPr>
+        <p:spPr>
+          <a:xfrm>
+            <a:off x="2509933" y="4588957"/>
+            <a:ext cx="821095" cy="807634"/>
+          </a:xfrm>
+          <a:prstGeom prst="ellipse">
+            <a:avLst/>
+          </a:prstGeom>
+          <a:noFill/>
+          <a:ln w="38100">
+            <a:solidFill>
+              <a:schemeClr val="tx1"/>
+            </a:solidFill>
+          </a:ln>
+        </p:spPr>
+        <p:style>
+          <a:lnRef idx="2">
+            <a:schemeClr val="accent1">
+              <a:shade val="50000"/>
+            </a:schemeClr>
+          </a:lnRef>
+          <a:fillRef idx="1">
+            <a:schemeClr val="accent1"/>
+          </a:fillRef>
+          <a:effectRef idx="0">
+            <a:schemeClr val="accent1"/>
+          </a:effectRef>
+          <a:fontRef idx="minor">
+            <a:schemeClr val="lt1"/>
+          </a:fontRef>
+        </p:style>
+        <p:txBody>
+          <a:bodyPr rtlCol="0" anchor="ctr"/>
+          <a:lstStyle/>
+          <a:p>
+            <a:pPr algn="ctr"/>
+            <a:r>
+              <a:rPr lang="en-US" dirty="0">
+                <a:solidFill>
+                  <a:schemeClr val="tx1"/>
+                </a:solidFill>
+              </a:rPr>
+              <a:t>G</a:t>
+            </a:r>
+          </a:p>
+        </p:txBody>
+      </p:sp>
+      <p:sp>
+        <p:nvSpPr>
+          <p:cNvPr id="23" name="Oval 22">
+            <a:extLst>
+              <a:ext uri="{FF2B5EF4-FFF2-40B4-BE49-F238E27FC236}">
+                <a16:creationId xmlns:a16="http://schemas.microsoft.com/office/drawing/2014/main" id="{153B827A-5616-4E29-BFD9-42EFB160E02C}"/>
+              </a:ext>
+            </a:extLst>
+          </p:cNvPr>
+          <p:cNvSpPr/>
+          <p:nvPr/>
+        </p:nvSpPr>
+        <p:spPr>
+          <a:xfrm>
+            <a:off x="5378517" y="4588957"/>
+            <a:ext cx="821095" cy="807634"/>
+          </a:xfrm>
+          <a:prstGeom prst="ellipse">
+            <a:avLst/>
+          </a:prstGeom>
+          <a:noFill/>
+          <a:ln w="38100">
+            <a:solidFill>
+              <a:schemeClr val="tx1"/>
+            </a:solidFill>
+          </a:ln>
+        </p:spPr>
+        <p:style>
+          <a:lnRef idx="2">
+            <a:schemeClr val="accent1">
+              <a:shade val="50000"/>
+            </a:schemeClr>
+          </a:lnRef>
+          <a:fillRef idx="1">
+            <a:schemeClr val="accent1"/>
+          </a:fillRef>
+          <a:effectRef idx="0">
+            <a:schemeClr val="accent1"/>
+          </a:effectRef>
+          <a:fontRef idx="minor">
+            <a:schemeClr val="lt1"/>
+          </a:fontRef>
+        </p:style>
+        <p:txBody>
+          <a:bodyPr rtlCol="0" anchor="ctr"/>
+          <a:lstStyle/>
+          <a:p>
+            <a:pPr algn="ctr"/>
+            <a:r>
+              <a:rPr lang="en-US" dirty="0">
+                <a:solidFill>
+                  <a:schemeClr val="tx1"/>
+                </a:solidFill>
+              </a:rPr>
+              <a:t>H</a:t>
+            </a:r>
+          </a:p>
+        </p:txBody>
+      </p:sp>
+      <p:sp>
+        <p:nvSpPr>
+          <p:cNvPr id="24" name="Oval 23">
+            <a:extLst>
+              <a:ext uri="{FF2B5EF4-FFF2-40B4-BE49-F238E27FC236}">
+                <a16:creationId xmlns:a16="http://schemas.microsoft.com/office/drawing/2014/main" id="{725CF79F-2D90-4A36-9917-C812A64CA31F}"/>
+              </a:ext>
+            </a:extLst>
+          </p:cNvPr>
+          <p:cNvSpPr/>
+          <p:nvPr/>
+        </p:nvSpPr>
+        <p:spPr>
+          <a:xfrm>
+            <a:off x="8504272" y="4588957"/>
+            <a:ext cx="821095" cy="807634"/>
+          </a:xfrm>
+          <a:prstGeom prst="ellipse">
+            <a:avLst/>
+          </a:prstGeom>
+          <a:noFill/>
+          <a:ln w="38100">
+            <a:solidFill>
+              <a:schemeClr val="tx1"/>
+            </a:solidFill>
+          </a:ln>
+        </p:spPr>
+        <p:style>
+          <a:lnRef idx="2">
+            <a:schemeClr val="accent1">
+              <a:shade val="50000"/>
+            </a:schemeClr>
+          </a:lnRef>
+          <a:fillRef idx="1">
+            <a:schemeClr val="accent1"/>
+          </a:fillRef>
+          <a:effectRef idx="0">
+            <a:schemeClr val="accent1"/>
+          </a:effectRef>
+          <a:fontRef idx="minor">
+            <a:schemeClr val="lt1"/>
+          </a:fontRef>
+        </p:style>
+        <p:txBody>
+          <a:bodyPr rtlCol="0" anchor="ctr"/>
+          <a:lstStyle/>
+          <a:p>
+            <a:pPr algn="ctr"/>
+            <a:r>
+              <a:rPr lang="en-US" dirty="0">
+                <a:solidFill>
+                  <a:schemeClr val="tx1"/>
+                </a:solidFill>
+              </a:rPr>
+              <a:t>I</a:t>
+            </a:r>
+          </a:p>
+        </p:txBody>
+      </p:sp>
+      <p:cxnSp>
+        <p:nvCxnSpPr>
+          <p:cNvPr id="26" name="Straight Connector 25">
+            <a:extLst>
+              <a:ext uri="{FF2B5EF4-FFF2-40B4-BE49-F238E27FC236}">
+                <a16:creationId xmlns:a16="http://schemas.microsoft.com/office/drawing/2014/main" id="{97DD2064-990C-4856-BC25-64F79EA443C8}"/>
+              </a:ext>
+            </a:extLst>
+          </p:cNvPr>
+          <p:cNvCxnSpPr>
+            <a:cxnSpLocks/>
+            <a:stCxn id="14" idx="2"/>
+          </p:cNvCxnSpPr>
+          <p:nvPr/>
+        </p:nvCxnSpPr>
+        <p:spPr>
+          <a:xfrm flipH="1">
+            <a:off x="6199613" y="1328430"/>
+            <a:ext cx="2304660" cy="25863"/>
+          </a:xfrm>
+          <a:prstGeom prst="line">
+            <a:avLst/>
+          </a:prstGeom>
+          <a:ln w="38100">
+            <a:solidFill>
+              <a:schemeClr val="tx1"/>
+            </a:solidFill>
+          </a:ln>
+        </p:spPr>
+        <p:style>
+          <a:lnRef idx="1">
+            <a:schemeClr val="accent1"/>
+          </a:lnRef>
+          <a:fillRef idx="0">
+            <a:schemeClr val="accent1"/>
+          </a:fillRef>
+          <a:effectRef idx="0">
+            <a:schemeClr val="accent1"/>
+          </a:effectRef>
+          <a:fontRef idx="minor">
+            <a:schemeClr val="tx1"/>
+          </a:fontRef>
+        </p:style>
+      </p:cxnSp>
+      <p:cxnSp>
+        <p:nvCxnSpPr>
+          <p:cNvPr id="27" name="Straight Connector 26">
+            <a:extLst>
+              <a:ext uri="{FF2B5EF4-FFF2-40B4-BE49-F238E27FC236}">
+                <a16:creationId xmlns:a16="http://schemas.microsoft.com/office/drawing/2014/main" id="{DF802BB5-DE64-4FB1-A629-83A57778ADC1}"/>
+              </a:ext>
+            </a:extLst>
+          </p:cNvPr>
+          <p:cNvCxnSpPr>
+            <a:cxnSpLocks/>
+          </p:cNvCxnSpPr>
+          <p:nvPr/>
+        </p:nvCxnSpPr>
+        <p:spPr>
+          <a:xfrm flipH="1">
+            <a:off x="6199613" y="3108861"/>
+            <a:ext cx="2304660" cy="25863"/>
+          </a:xfrm>
+          <a:prstGeom prst="line">
+            <a:avLst/>
+          </a:prstGeom>
+          <a:ln w="38100">
+            <a:solidFill>
+              <a:schemeClr val="tx1"/>
+            </a:solidFill>
+          </a:ln>
+        </p:spPr>
+        <p:style>
+          <a:lnRef idx="1">
+            <a:schemeClr val="accent1"/>
+          </a:lnRef>
+          <a:fillRef idx="0">
+            <a:schemeClr val="accent1"/>
+          </a:fillRef>
+          <a:effectRef idx="0">
+            <a:schemeClr val="accent1"/>
+          </a:effectRef>
+          <a:fontRef idx="minor">
+            <a:schemeClr val="tx1"/>
+          </a:fontRef>
+        </p:style>
+      </p:cxnSp>
+      <p:cxnSp>
+        <p:nvCxnSpPr>
+          <p:cNvPr id="30" name="Straight Connector 29">
+            <a:extLst>
+              <a:ext uri="{FF2B5EF4-FFF2-40B4-BE49-F238E27FC236}">
+                <a16:creationId xmlns:a16="http://schemas.microsoft.com/office/drawing/2014/main" id="{9A4CACE5-89D5-4DF8-9D74-7F86F9F23EB7}"/>
+              </a:ext>
+            </a:extLst>
+          </p:cNvPr>
+          <p:cNvCxnSpPr>
+            <a:cxnSpLocks/>
+          </p:cNvCxnSpPr>
+          <p:nvPr/>
+        </p:nvCxnSpPr>
+        <p:spPr>
+          <a:xfrm flipH="1">
+            <a:off x="3331028" y="5048396"/>
+            <a:ext cx="2047490" cy="17242"/>
+          </a:xfrm>
+          <a:prstGeom prst="line">
+            <a:avLst/>
+          </a:prstGeom>
+          <a:ln w="38100">
+            <a:solidFill>
+              <a:schemeClr val="tx1"/>
+            </a:solidFill>
+          </a:ln>
+        </p:spPr>
+        <p:style>
+          <a:lnRef idx="1">
+            <a:schemeClr val="accent1"/>
+          </a:lnRef>
+          <a:fillRef idx="0">
+            <a:schemeClr val="accent1"/>
+          </a:fillRef>
+          <a:effectRef idx="0">
+            <a:schemeClr val="accent1"/>
+          </a:effectRef>
+          <a:fontRef idx="minor">
+            <a:schemeClr val="tx1"/>
+          </a:fontRef>
+        </p:style>
+      </p:cxnSp>
+      <p:cxnSp>
+        <p:nvCxnSpPr>
+          <p:cNvPr id="31" name="Straight Connector 30">
+            <a:extLst>
+              <a:ext uri="{FF2B5EF4-FFF2-40B4-BE49-F238E27FC236}">
+                <a16:creationId xmlns:a16="http://schemas.microsoft.com/office/drawing/2014/main" id="{BFEF5EF6-2408-4DD0-8030-FA0AC36BC642}"/>
+              </a:ext>
+            </a:extLst>
+          </p:cNvPr>
+          <p:cNvCxnSpPr>
+            <a:cxnSpLocks/>
+            <a:stCxn id="22" idx="0"/>
+            <a:endCxn id="5" idx="4"/>
+          </p:cNvCxnSpPr>
+          <p:nvPr/>
+        </p:nvCxnSpPr>
+        <p:spPr>
+          <a:xfrm flipV="1">
+            <a:off x="2920481" y="3538541"/>
+            <a:ext cx="0" cy="1050416"/>
+          </a:xfrm>
+          <a:prstGeom prst="line">
+            <a:avLst/>
+          </a:prstGeom>
+          <a:ln w="38100">
+            <a:solidFill>
+              <a:schemeClr val="tx1"/>
+            </a:solidFill>
+          </a:ln>
+        </p:spPr>
+        <p:style>
+          <a:lnRef idx="1">
+            <a:schemeClr val="accent1"/>
+          </a:lnRef>
+          <a:fillRef idx="0">
+            <a:schemeClr val="accent1"/>
+          </a:fillRef>
+          <a:effectRef idx="0">
+            <a:schemeClr val="accent1"/>
+          </a:effectRef>
+          <a:fontRef idx="minor">
+            <a:schemeClr val="tx1"/>
+          </a:fontRef>
+        </p:style>
+      </p:cxnSp>
+      <p:cxnSp>
+        <p:nvCxnSpPr>
+          <p:cNvPr id="32" name="Straight Connector 31">
+            <a:extLst>
+              <a:ext uri="{FF2B5EF4-FFF2-40B4-BE49-F238E27FC236}">
+                <a16:creationId xmlns:a16="http://schemas.microsoft.com/office/drawing/2014/main" id="{20B610F1-5962-4AF1-93BF-427AF6AAD489}"/>
+              </a:ext>
+            </a:extLst>
+          </p:cNvPr>
+          <p:cNvCxnSpPr>
+            <a:cxnSpLocks/>
+            <a:endCxn id="2" idx="4"/>
+          </p:cNvCxnSpPr>
+          <p:nvPr/>
+        </p:nvCxnSpPr>
+        <p:spPr>
+          <a:xfrm flipV="1">
+            <a:off x="2920480" y="1768686"/>
+            <a:ext cx="2" cy="962222"/>
+          </a:xfrm>
+          <a:prstGeom prst="line">
+            <a:avLst/>
+          </a:prstGeom>
+          <a:ln w="38100">
+            <a:solidFill>
+              <a:schemeClr val="tx1"/>
+            </a:solidFill>
+          </a:ln>
+        </p:spPr>
+        <p:style>
+          <a:lnRef idx="1">
+            <a:schemeClr val="accent1"/>
+          </a:lnRef>
+          <a:fillRef idx="0">
+            <a:schemeClr val="accent1"/>
+          </a:fillRef>
+          <a:effectRef idx="0">
+            <a:schemeClr val="accent1"/>
+          </a:effectRef>
+          <a:fontRef idx="minor">
+            <a:schemeClr val="tx1"/>
+          </a:fontRef>
+        </p:style>
+      </p:cxnSp>
+      <p:cxnSp>
+        <p:nvCxnSpPr>
+          <p:cNvPr id="35" name="Straight Connector 34">
+            <a:extLst>
+              <a:ext uri="{FF2B5EF4-FFF2-40B4-BE49-F238E27FC236}">
+                <a16:creationId xmlns:a16="http://schemas.microsoft.com/office/drawing/2014/main" id="{45E55EB7-A37B-4479-8DDB-72FD7BE4CBE8}"/>
+              </a:ext>
+            </a:extLst>
+          </p:cNvPr>
+          <p:cNvCxnSpPr>
+            <a:cxnSpLocks/>
+          </p:cNvCxnSpPr>
+          <p:nvPr/>
+        </p:nvCxnSpPr>
+        <p:spPr>
+          <a:xfrm flipV="1">
+            <a:off x="8914817" y="1768685"/>
+            <a:ext cx="2" cy="962222"/>
+          </a:xfrm>
+          <a:prstGeom prst="line">
+            <a:avLst/>
+          </a:prstGeom>
+          <a:ln w="38100">
+            <a:solidFill>
+              <a:schemeClr val="tx1"/>
+            </a:solidFill>
+          </a:ln>
+        </p:spPr>
+        <p:style>
+          <a:lnRef idx="1">
+            <a:schemeClr val="accent1"/>
+          </a:lnRef>
+          <a:fillRef idx="0">
+            <a:schemeClr val="accent1"/>
+          </a:fillRef>
+          <a:effectRef idx="0">
+            <a:schemeClr val="accent1"/>
+          </a:effectRef>
+          <a:fontRef idx="minor">
+            <a:schemeClr val="tx1"/>
+          </a:fontRef>
+        </p:style>
+      </p:cxnSp>
+      <p:cxnSp>
+        <p:nvCxnSpPr>
+          <p:cNvPr id="36" name="Straight Connector 35">
+            <a:extLst>
+              <a:ext uri="{FF2B5EF4-FFF2-40B4-BE49-F238E27FC236}">
+                <a16:creationId xmlns:a16="http://schemas.microsoft.com/office/drawing/2014/main" id="{005BB9B0-EDD9-4329-B4AD-14F115E693EB}"/>
+              </a:ext>
+            </a:extLst>
+          </p:cNvPr>
+          <p:cNvCxnSpPr>
+            <a:cxnSpLocks/>
+          </p:cNvCxnSpPr>
+          <p:nvPr/>
+        </p:nvCxnSpPr>
+        <p:spPr>
+          <a:xfrm flipV="1">
+            <a:off x="5789062" y="3538541"/>
+            <a:ext cx="0" cy="1050416"/>
+          </a:xfrm>
+          <a:prstGeom prst="line">
+            <a:avLst/>
+          </a:prstGeom>
+          <a:ln w="38100">
+            <a:solidFill>
+              <a:schemeClr val="tx1"/>
+            </a:solidFill>
+          </a:ln>
+        </p:spPr>
+        <p:style>
+          <a:lnRef idx="1">
+            <a:schemeClr val="accent1"/>
+          </a:lnRef>
+          <a:fillRef idx="0">
+            <a:schemeClr val="accent1"/>
+          </a:fillRef>
+          <a:effectRef idx="0">
+            <a:schemeClr val="accent1"/>
+          </a:effectRef>
+          <a:fontRef idx="minor">
+            <a:schemeClr val="tx1"/>
+          </a:fontRef>
+        </p:style>
+      </p:cxnSp>
+      <p:cxnSp>
+        <p:nvCxnSpPr>
+          <p:cNvPr id="38" name="Straight Connector 37">
+            <a:extLst>
+              <a:ext uri="{FF2B5EF4-FFF2-40B4-BE49-F238E27FC236}">
+                <a16:creationId xmlns:a16="http://schemas.microsoft.com/office/drawing/2014/main" id="{DAFE4FD1-A8C2-492A-8342-530AFCC4B08B}"/>
+              </a:ext>
+            </a:extLst>
+          </p:cNvPr>
+          <p:cNvCxnSpPr>
+            <a:cxnSpLocks/>
+            <a:stCxn id="24" idx="1"/>
+            <a:endCxn id="6" idx="5"/>
+          </p:cNvCxnSpPr>
+          <p:nvPr/>
+        </p:nvCxnSpPr>
+        <p:spPr>
+          <a:xfrm flipH="1" flipV="1">
+            <a:off x="6079365" y="3420266"/>
+            <a:ext cx="2545154" cy="1286966"/>
+          </a:xfrm>
+          <a:prstGeom prst="line">
+            <a:avLst/>
+          </a:prstGeom>
+          <a:ln w="38100">
+            <a:solidFill>
+              <a:schemeClr val="tx1"/>
+            </a:solidFill>
+          </a:ln>
+        </p:spPr>
+        <p:style>
+          <a:lnRef idx="1">
+            <a:schemeClr val="accent1"/>
+          </a:lnRef>
+          <a:fillRef idx="0">
+            <a:schemeClr val="accent1"/>
+          </a:fillRef>
+          <a:effectRef idx="0">
+            <a:schemeClr val="accent1"/>
+          </a:effectRef>
+          <a:fontRef idx="minor">
+            <a:schemeClr val="tx1"/>
+          </a:fontRef>
+        </p:style>
+      </p:cxnSp>
+      <p:cxnSp>
+        <p:nvCxnSpPr>
+          <p:cNvPr id="44" name="Straight Connector 43">
+            <a:extLst>
+              <a:ext uri="{FF2B5EF4-FFF2-40B4-BE49-F238E27FC236}">
+                <a16:creationId xmlns:a16="http://schemas.microsoft.com/office/drawing/2014/main" id="{9A2FCB59-772A-4B21-BD9C-16F20D1E99EB}"/>
+              </a:ext>
+            </a:extLst>
+          </p:cNvPr>
+          <p:cNvCxnSpPr>
+            <a:cxnSpLocks/>
+            <a:stCxn id="2" idx="5"/>
+            <a:endCxn id="6" idx="1"/>
+          </p:cNvCxnSpPr>
+          <p:nvPr/>
+        </p:nvCxnSpPr>
+        <p:spPr>
+          <a:xfrm>
+            <a:off x="3210782" y="1650411"/>
+            <a:ext cx="2287982" cy="1198771"/>
+          </a:xfrm>
+          <a:prstGeom prst="line">
+            <a:avLst/>
+          </a:prstGeom>
+          <a:ln w="38100">
+            <a:solidFill>
+              <a:schemeClr val="tx1"/>
+            </a:solidFill>
+          </a:ln>
+        </p:spPr>
+        <p:style>
+          <a:lnRef idx="1">
+            <a:schemeClr val="accent1"/>
+          </a:lnRef>
+          <a:fillRef idx="0">
+            <a:schemeClr val="accent1"/>
+          </a:fillRef>
+          <a:effectRef idx="0">
+            <a:schemeClr val="accent1"/>
+          </a:effectRef>
+          <a:fontRef idx="minor">
+            <a:schemeClr val="tx1"/>
+          </a:fontRef>
+        </p:style>
+      </p:cxnSp>
+      <p:sp>
+        <p:nvSpPr>
+          <p:cNvPr id="51" name="TextBox 50">
+            <a:extLst>
+              <a:ext uri="{FF2B5EF4-FFF2-40B4-BE49-F238E27FC236}">
+                <a16:creationId xmlns:a16="http://schemas.microsoft.com/office/drawing/2014/main" id="{DA6F015F-1E76-48A4-9FDF-145D85285A82}"/>
+              </a:ext>
+            </a:extLst>
+          </p:cNvPr>
+          <p:cNvSpPr txBox="1"/>
+          <p:nvPr/>
+        </p:nvSpPr>
+        <p:spPr>
+          <a:xfrm>
+            <a:off x="7275164" y="976689"/>
+            <a:ext cx="301686" cy="369332"/>
+          </a:xfrm>
+          <a:prstGeom prst="rect">
+            <a:avLst/>
+          </a:prstGeom>
+          <a:noFill/>
+        </p:spPr>
+        <p:txBody>
+          <a:bodyPr wrap="none" rtlCol="0">
+            <a:spAutoFit/>
+          </a:bodyPr>
+          <a:lstStyle/>
+          <a:p>
+            <a:r>
+              <a:rPr lang="en-US" dirty="0"/>
+              <a:t>1</a:t>
+            </a:r>
+          </a:p>
+        </p:txBody>
+      </p:sp>
+      <p:sp>
+        <p:nvSpPr>
+          <p:cNvPr id="52" name="TextBox 51">
+            <a:extLst>
+              <a:ext uri="{FF2B5EF4-FFF2-40B4-BE49-F238E27FC236}">
+                <a16:creationId xmlns:a16="http://schemas.microsoft.com/office/drawing/2014/main" id="{A4B1D51E-A557-4B30-B942-65A20A786F78}"/>
+              </a:ext>
+            </a:extLst>
+          </p:cNvPr>
+          <p:cNvSpPr txBox="1"/>
+          <p:nvPr/>
+        </p:nvSpPr>
+        <p:spPr>
+          <a:xfrm>
+            <a:off x="8914817" y="2046911"/>
+            <a:ext cx="301686" cy="369332"/>
+          </a:xfrm>
+          <a:prstGeom prst="rect">
+            <a:avLst/>
+          </a:prstGeom>
+          <a:noFill/>
+        </p:spPr>
+        <p:txBody>
+          <a:bodyPr wrap="none" rtlCol="0">
+            <a:spAutoFit/>
+          </a:bodyPr>
+          <a:lstStyle/>
+          <a:p>
+            <a:r>
+              <a:rPr lang="en-US" dirty="0"/>
+              <a:t>3</a:t>
+            </a:r>
+          </a:p>
+        </p:txBody>
+      </p:sp>
+      <p:sp>
+        <p:nvSpPr>
+          <p:cNvPr id="54" name="TextBox 53">
+            <a:extLst>
+              <a:ext uri="{FF2B5EF4-FFF2-40B4-BE49-F238E27FC236}">
+                <a16:creationId xmlns:a16="http://schemas.microsoft.com/office/drawing/2014/main" id="{6A82F625-343A-4B5A-9C62-F85C22AEC046}"/>
+              </a:ext>
+            </a:extLst>
+          </p:cNvPr>
+          <p:cNvSpPr txBox="1"/>
+          <p:nvPr/>
+        </p:nvSpPr>
+        <p:spPr>
+          <a:xfrm>
+            <a:off x="7254361" y="3785812"/>
+            <a:ext cx="301686" cy="369332"/>
+          </a:xfrm>
+          <a:prstGeom prst="rect">
+            <a:avLst/>
+          </a:prstGeom>
+          <a:noFill/>
+        </p:spPr>
+        <p:txBody>
+          <a:bodyPr wrap="none" rtlCol="0">
+            <a:spAutoFit/>
+          </a:bodyPr>
+          <a:lstStyle/>
+          <a:p>
+            <a:r>
+              <a:rPr lang="en-US" dirty="0"/>
+              <a:t>5</a:t>
+            </a:r>
+          </a:p>
+        </p:txBody>
+      </p:sp>
+      <p:sp>
+        <p:nvSpPr>
+          <p:cNvPr id="55" name="TextBox 54">
+            <a:extLst>
+              <a:ext uri="{FF2B5EF4-FFF2-40B4-BE49-F238E27FC236}">
+                <a16:creationId xmlns:a16="http://schemas.microsoft.com/office/drawing/2014/main" id="{FB9DB96F-0314-4195-B0DC-579C05AAD0E3}"/>
+              </a:ext>
+            </a:extLst>
+          </p:cNvPr>
+          <p:cNvSpPr txBox="1"/>
+          <p:nvPr/>
+        </p:nvSpPr>
+        <p:spPr>
+          <a:xfrm>
+            <a:off x="7254361" y="2752460"/>
+            <a:ext cx="301686" cy="369332"/>
+          </a:xfrm>
+          <a:prstGeom prst="rect">
+            <a:avLst/>
+          </a:prstGeom>
+          <a:noFill/>
+        </p:spPr>
+        <p:txBody>
+          <a:bodyPr wrap="none" rtlCol="0">
+            <a:spAutoFit/>
+          </a:bodyPr>
+          <a:lstStyle/>
+          <a:p>
+            <a:r>
+              <a:rPr lang="en-US" dirty="0"/>
+              <a:t>3</a:t>
+            </a:r>
+          </a:p>
+        </p:txBody>
+      </p:sp>
+      <p:sp>
+        <p:nvSpPr>
+          <p:cNvPr id="57" name="TextBox 56">
+            <a:extLst>
+              <a:ext uri="{FF2B5EF4-FFF2-40B4-BE49-F238E27FC236}">
+                <a16:creationId xmlns:a16="http://schemas.microsoft.com/office/drawing/2014/main" id="{643E6EF6-CE62-4BBF-A0A2-5CE0341037C4}"/>
+              </a:ext>
+            </a:extLst>
+          </p:cNvPr>
+          <p:cNvSpPr txBox="1"/>
+          <p:nvPr/>
+        </p:nvSpPr>
+        <p:spPr>
+          <a:xfrm>
+            <a:off x="4350575" y="1998052"/>
+            <a:ext cx="301686" cy="369332"/>
+          </a:xfrm>
+          <a:prstGeom prst="rect">
+            <a:avLst/>
+          </a:prstGeom>
+          <a:noFill/>
+        </p:spPr>
+        <p:txBody>
+          <a:bodyPr wrap="none" rtlCol="0">
+            <a:spAutoFit/>
+          </a:bodyPr>
+          <a:lstStyle/>
+          <a:p>
+            <a:r>
+              <a:rPr lang="en-US" dirty="0"/>
+              <a:t>2</a:t>
+            </a:r>
+          </a:p>
+        </p:txBody>
+      </p:sp>
+      <p:sp>
+        <p:nvSpPr>
+          <p:cNvPr id="58" name="TextBox 57">
+            <a:extLst>
+              <a:ext uri="{FF2B5EF4-FFF2-40B4-BE49-F238E27FC236}">
+                <a16:creationId xmlns:a16="http://schemas.microsoft.com/office/drawing/2014/main" id="{3EBDC43F-C8D9-47FA-9BBB-572FD161063E}"/>
+              </a:ext>
+            </a:extLst>
+          </p:cNvPr>
+          <p:cNvSpPr txBox="1"/>
+          <p:nvPr/>
+        </p:nvSpPr>
+        <p:spPr>
+          <a:xfrm>
+            <a:off x="2929733" y="2115895"/>
+            <a:ext cx="301686" cy="369332"/>
+          </a:xfrm>
+          <a:prstGeom prst="rect">
+            <a:avLst/>
+          </a:prstGeom>
+          <a:noFill/>
+        </p:spPr>
+        <p:txBody>
+          <a:bodyPr wrap="none" rtlCol="0">
+            <a:spAutoFit/>
+          </a:bodyPr>
+          <a:lstStyle/>
+          <a:p>
+            <a:r>
+              <a:rPr lang="en-US" dirty="0"/>
+              <a:t>5</a:t>
+            </a:r>
+          </a:p>
+        </p:txBody>
+      </p:sp>
+      <p:sp>
+        <p:nvSpPr>
+          <p:cNvPr id="59" name="TextBox 58">
+            <a:extLst>
+              <a:ext uri="{FF2B5EF4-FFF2-40B4-BE49-F238E27FC236}">
+                <a16:creationId xmlns:a16="http://schemas.microsoft.com/office/drawing/2014/main" id="{13FA8ACB-59E2-4DD2-B2DB-B84D658A65A0}"/>
+              </a:ext>
+            </a:extLst>
+          </p:cNvPr>
+          <p:cNvSpPr txBox="1"/>
+          <p:nvPr/>
+        </p:nvSpPr>
+        <p:spPr>
+          <a:xfrm>
+            <a:off x="2909094" y="3849588"/>
+            <a:ext cx="301686" cy="369332"/>
+          </a:xfrm>
+          <a:prstGeom prst="rect">
+            <a:avLst/>
+          </a:prstGeom>
+          <a:noFill/>
+        </p:spPr>
+        <p:txBody>
+          <a:bodyPr wrap="none" rtlCol="0">
+            <a:spAutoFit/>
+          </a:bodyPr>
+          <a:lstStyle/>
+          <a:p>
+            <a:r>
+              <a:rPr lang="en-US" dirty="0"/>
+              <a:t>4</a:t>
+            </a:r>
+          </a:p>
+        </p:txBody>
+      </p:sp>
+      <p:sp>
+        <p:nvSpPr>
+          <p:cNvPr id="61" name="TextBox 60">
+            <a:extLst>
+              <a:ext uri="{FF2B5EF4-FFF2-40B4-BE49-F238E27FC236}">
+                <a16:creationId xmlns:a16="http://schemas.microsoft.com/office/drawing/2014/main" id="{70848D18-14D6-403D-A7AE-E0F3C524EF63}"/>
+              </a:ext>
+            </a:extLst>
+          </p:cNvPr>
+          <p:cNvSpPr txBox="1"/>
+          <p:nvPr/>
+        </p:nvSpPr>
+        <p:spPr>
+          <a:xfrm>
+            <a:off x="5794707" y="3913989"/>
+            <a:ext cx="301686" cy="369332"/>
+          </a:xfrm>
+          <a:prstGeom prst="rect">
+            <a:avLst/>
+          </a:prstGeom>
+          <a:noFill/>
+        </p:spPr>
+        <p:txBody>
+          <a:bodyPr wrap="none" rtlCol="0">
+            <a:spAutoFit/>
+          </a:bodyPr>
+          <a:lstStyle/>
+          <a:p>
+            <a:r>
+              <a:rPr lang="en-US" dirty="0"/>
+              <a:t>3</a:t>
+            </a:r>
+          </a:p>
+        </p:txBody>
+      </p:sp>
+      <p:sp>
+        <p:nvSpPr>
+          <p:cNvPr id="62" name="TextBox 61">
+            <a:extLst>
+              <a:ext uri="{FF2B5EF4-FFF2-40B4-BE49-F238E27FC236}">
+                <a16:creationId xmlns:a16="http://schemas.microsoft.com/office/drawing/2014/main" id="{D5616115-D377-40CC-BB32-1CEBF8251502}"/>
+              </a:ext>
+            </a:extLst>
+          </p:cNvPr>
+          <p:cNvSpPr txBox="1"/>
+          <p:nvPr/>
+        </p:nvSpPr>
+        <p:spPr>
+          <a:xfrm>
+            <a:off x="4585240" y="4707232"/>
+            <a:ext cx="301686" cy="369332"/>
+          </a:xfrm>
+          <a:prstGeom prst="rect">
+            <a:avLst/>
+          </a:prstGeom>
+          <a:noFill/>
+        </p:spPr>
+        <p:txBody>
+          <a:bodyPr wrap="none" rtlCol="0">
+            <a:spAutoFit/>
+          </a:bodyPr>
+          <a:lstStyle/>
+          <a:p>
+            <a:r>
+              <a:rPr lang="en-US" dirty="0"/>
+              <a:t>5</a:t>
+            </a:r>
+          </a:p>
+        </p:txBody>
+      </p:sp>
+    </p:spTree>
+    <p:extLst>
+      <p:ext uri="{BB962C8B-B14F-4D97-AF65-F5344CB8AC3E}">
+        <p14:creationId xmlns:p14="http://schemas.microsoft.com/office/powerpoint/2010/main" val="194039942"/>
+      </p:ext>
+    </p:extLst>
+  </p:cSld>
+  <p:clrMapOvr>
+    <a:masterClrMapping/>
+  </p:clrMapOvr>
+</p:sld>
+</file>
+
+<file path=ppt/slides/slide4.xml><?xml version="1.0" encoding="utf-8"?>
+<p:sld xmlns:a="http://schemas.openxmlformats.org/drawingml/2006/main" xmlns:r="http://schemas.openxmlformats.org/officeDocument/2006/relationships" xmlns:p="http://schemas.openxmlformats.org/presentationml/2006/main">
+  <p:cSld>
+    <p:spTree>
+      <p:nvGrpSpPr>
+        <p:cNvPr id="1" name=""/>
+        <p:cNvGrpSpPr/>
+        <p:nvPr/>
+      </p:nvGrpSpPr>
+      <p:grpSpPr>
+        <a:xfrm>
+          <a:off x="0" y="0"/>
+          <a:ext cx="0" cy="0"/>
+          <a:chOff x="0" y="0"/>
+          <a:chExt cx="0" cy="0"/>
+        </a:xfrm>
+      </p:grpSpPr>
+      <p:sp>
+        <p:nvSpPr>
+          <p:cNvPr id="2" name="Oval 1">
+            <a:extLst>
+              <a:ext uri="{FF2B5EF4-FFF2-40B4-BE49-F238E27FC236}">
+                <a16:creationId xmlns:a16="http://schemas.microsoft.com/office/drawing/2014/main" id="{8149D9A1-4580-48C3-92A0-3C20B034CD93}"/>
+              </a:ext>
+            </a:extLst>
+          </p:cNvPr>
+          <p:cNvSpPr/>
+          <p:nvPr/>
+        </p:nvSpPr>
+        <p:spPr>
+          <a:xfrm>
+            <a:off x="2509934" y="961052"/>
+            <a:ext cx="821095" cy="807634"/>
+          </a:xfrm>
+          <a:prstGeom prst="ellipse">
+            <a:avLst/>
+          </a:prstGeom>
+          <a:noFill/>
+          <a:ln w="38100">
+            <a:solidFill>
+              <a:schemeClr val="tx1"/>
+            </a:solidFill>
+          </a:ln>
+        </p:spPr>
+        <p:style>
+          <a:lnRef idx="2">
+            <a:schemeClr val="accent1">
+              <a:shade val="50000"/>
+            </a:schemeClr>
+          </a:lnRef>
+          <a:fillRef idx="1">
+            <a:schemeClr val="accent1"/>
+          </a:fillRef>
+          <a:effectRef idx="0">
+            <a:schemeClr val="accent1"/>
+          </a:effectRef>
+          <a:fontRef idx="minor">
+            <a:schemeClr val="lt1"/>
+          </a:fontRef>
+        </p:style>
+        <p:txBody>
+          <a:bodyPr rtlCol="0" anchor="ctr"/>
+          <a:lstStyle/>
+          <a:p>
+            <a:pPr algn="ctr"/>
+            <a:r>
+              <a:rPr lang="en-US" dirty="0">
+                <a:solidFill>
+                  <a:schemeClr val="tx1"/>
+                </a:solidFill>
+              </a:rPr>
+              <a:t>A</a:t>
+            </a:r>
+          </a:p>
+        </p:txBody>
+      </p:sp>
+      <p:sp>
+        <p:nvSpPr>
+          <p:cNvPr id="14" name="Oval 13">
+            <a:extLst>
+              <a:ext uri="{FF2B5EF4-FFF2-40B4-BE49-F238E27FC236}">
+                <a16:creationId xmlns:a16="http://schemas.microsoft.com/office/drawing/2014/main" id="{FD26DF91-AA5B-41C9-98B8-1E1FE5DA81A4}"/>
+              </a:ext>
+            </a:extLst>
+          </p:cNvPr>
+          <p:cNvSpPr/>
+          <p:nvPr/>
+        </p:nvSpPr>
+        <p:spPr>
+          <a:xfrm>
+            <a:off x="8504273" y="924613"/>
+            <a:ext cx="821095" cy="807634"/>
+          </a:xfrm>
+          <a:prstGeom prst="ellipse">
+            <a:avLst/>
+          </a:prstGeom>
+          <a:noFill/>
+          <a:ln w="38100">
+            <a:solidFill>
+              <a:schemeClr val="tx1"/>
+            </a:solidFill>
+          </a:ln>
+        </p:spPr>
+        <p:style>
+          <a:lnRef idx="2">
+            <a:schemeClr val="accent1">
+              <a:shade val="50000"/>
+            </a:schemeClr>
+          </a:lnRef>
+          <a:fillRef idx="1">
+            <a:schemeClr val="accent1"/>
+          </a:fillRef>
+          <a:effectRef idx="0">
+            <a:schemeClr val="accent1"/>
+          </a:effectRef>
+          <a:fontRef idx="minor">
+            <a:schemeClr val="lt1"/>
+          </a:fontRef>
+        </p:style>
+        <p:txBody>
+          <a:bodyPr rtlCol="0" anchor="ctr"/>
+          <a:lstStyle/>
+          <a:p>
+            <a:pPr algn="ctr"/>
+            <a:r>
+              <a:rPr lang="en-US" dirty="0">
+                <a:solidFill>
+                  <a:schemeClr val="tx1"/>
+                </a:solidFill>
+              </a:rPr>
+              <a:t>C</a:t>
+            </a:r>
+          </a:p>
+        </p:txBody>
+      </p:sp>
+      <p:sp>
+        <p:nvSpPr>
+          <p:cNvPr id="22" name="Oval 21">
+            <a:extLst>
+              <a:ext uri="{FF2B5EF4-FFF2-40B4-BE49-F238E27FC236}">
+                <a16:creationId xmlns:a16="http://schemas.microsoft.com/office/drawing/2014/main" id="{B310E9A9-DCE9-437B-9921-22DBF9CBE2FB}"/>
+              </a:ext>
+            </a:extLst>
+          </p:cNvPr>
+          <p:cNvSpPr/>
+          <p:nvPr/>
+        </p:nvSpPr>
+        <p:spPr>
+          <a:xfrm>
+            <a:off x="2509933" y="4588957"/>
+            <a:ext cx="821095" cy="807634"/>
+          </a:xfrm>
+          <a:prstGeom prst="ellipse">
+            <a:avLst/>
+          </a:prstGeom>
+          <a:noFill/>
+          <a:ln w="38100">
+            <a:solidFill>
+              <a:schemeClr val="tx1"/>
+            </a:solidFill>
+          </a:ln>
+        </p:spPr>
+        <p:style>
+          <a:lnRef idx="2">
+            <a:schemeClr val="accent1">
+              <a:shade val="50000"/>
+            </a:schemeClr>
+          </a:lnRef>
+          <a:fillRef idx="1">
+            <a:schemeClr val="accent1"/>
+          </a:fillRef>
+          <a:effectRef idx="0">
+            <a:schemeClr val="accent1"/>
+          </a:effectRef>
+          <a:fontRef idx="minor">
+            <a:schemeClr val="lt1"/>
+          </a:fontRef>
+        </p:style>
+        <p:txBody>
+          <a:bodyPr rtlCol="0" anchor="ctr"/>
+          <a:lstStyle/>
+          <a:p>
+            <a:pPr algn="ctr"/>
+            <a:r>
+              <a:rPr lang="en-US" dirty="0">
+                <a:solidFill>
+                  <a:schemeClr val="tx1"/>
+                </a:solidFill>
+              </a:rPr>
+              <a:t>G</a:t>
+            </a:r>
+          </a:p>
+        </p:txBody>
+      </p:sp>
+      <p:cxnSp>
+        <p:nvCxnSpPr>
+          <p:cNvPr id="25" name="Straight Connector 24">
+            <a:extLst>
+              <a:ext uri="{FF2B5EF4-FFF2-40B4-BE49-F238E27FC236}">
+                <a16:creationId xmlns:a16="http://schemas.microsoft.com/office/drawing/2014/main" id="{0C8EFA75-D242-4B4E-835D-7CB8F386D482}"/>
+              </a:ext>
+            </a:extLst>
+          </p:cNvPr>
+          <p:cNvCxnSpPr>
+            <a:cxnSpLocks/>
+            <a:stCxn id="14" idx="2"/>
+          </p:cNvCxnSpPr>
+          <p:nvPr/>
+        </p:nvCxnSpPr>
+        <p:spPr>
+          <a:xfrm flipH="1">
+            <a:off x="3331029" y="1328430"/>
+            <a:ext cx="5173244" cy="17242"/>
+          </a:xfrm>
+          <a:prstGeom prst="line">
+            <a:avLst/>
+          </a:prstGeom>
+          <a:ln w="38100">
+            <a:solidFill>
+              <a:schemeClr val="tx1"/>
+            </a:solidFill>
+          </a:ln>
+        </p:spPr>
+        <p:style>
+          <a:lnRef idx="1">
+            <a:schemeClr val="accent1"/>
+          </a:lnRef>
+          <a:fillRef idx="0">
+            <a:schemeClr val="accent1"/>
+          </a:fillRef>
+          <a:effectRef idx="0">
+            <a:schemeClr val="accent1"/>
+          </a:effectRef>
+          <a:fontRef idx="minor">
+            <a:schemeClr val="tx1"/>
+          </a:fontRef>
+        </p:style>
+      </p:cxnSp>
+      <p:cxnSp>
+        <p:nvCxnSpPr>
+          <p:cNvPr id="31" name="Straight Connector 30">
+            <a:extLst>
+              <a:ext uri="{FF2B5EF4-FFF2-40B4-BE49-F238E27FC236}">
+                <a16:creationId xmlns:a16="http://schemas.microsoft.com/office/drawing/2014/main" id="{BFEF5EF6-2408-4DD0-8030-FA0AC36BC642}"/>
+              </a:ext>
+            </a:extLst>
+          </p:cNvPr>
+          <p:cNvCxnSpPr>
+            <a:cxnSpLocks/>
+            <a:stCxn id="22" idx="0"/>
+          </p:cNvCxnSpPr>
+          <p:nvPr/>
+        </p:nvCxnSpPr>
+        <p:spPr>
+          <a:xfrm flipH="1" flipV="1">
+            <a:off x="2920480" y="2528596"/>
+            <a:ext cx="1" cy="2060361"/>
+          </a:xfrm>
+          <a:prstGeom prst="line">
+            <a:avLst/>
+          </a:prstGeom>
+          <a:ln w="38100">
+            <a:solidFill>
+              <a:schemeClr val="tx1"/>
+            </a:solidFill>
+          </a:ln>
+        </p:spPr>
+        <p:style>
+          <a:lnRef idx="1">
+            <a:schemeClr val="accent1"/>
+          </a:lnRef>
+          <a:fillRef idx="0">
+            <a:schemeClr val="accent1"/>
+          </a:fillRef>
+          <a:effectRef idx="0">
+            <a:schemeClr val="accent1"/>
+          </a:effectRef>
+          <a:fontRef idx="minor">
+            <a:schemeClr val="tx1"/>
+          </a:fontRef>
+        </p:style>
+      </p:cxnSp>
+      <p:cxnSp>
+        <p:nvCxnSpPr>
+          <p:cNvPr id="32" name="Straight Connector 31">
+            <a:extLst>
+              <a:ext uri="{FF2B5EF4-FFF2-40B4-BE49-F238E27FC236}">
+                <a16:creationId xmlns:a16="http://schemas.microsoft.com/office/drawing/2014/main" id="{20B610F1-5962-4AF1-93BF-427AF6AAD489}"/>
+              </a:ext>
+            </a:extLst>
+          </p:cNvPr>
+          <p:cNvCxnSpPr>
+            <a:cxnSpLocks/>
+            <a:endCxn id="2" idx="4"/>
+          </p:cNvCxnSpPr>
+          <p:nvPr/>
+        </p:nvCxnSpPr>
+        <p:spPr>
+          <a:xfrm flipV="1">
+            <a:off x="2920480" y="1768686"/>
+            <a:ext cx="2" cy="962222"/>
+          </a:xfrm>
+          <a:prstGeom prst="line">
+            <a:avLst/>
+          </a:prstGeom>
+          <a:ln w="38100">
+            <a:solidFill>
+              <a:schemeClr val="tx1"/>
+            </a:solidFill>
+          </a:ln>
+        </p:spPr>
+        <p:style>
+          <a:lnRef idx="1">
+            <a:schemeClr val="accent1"/>
+          </a:lnRef>
+          <a:fillRef idx="0">
+            <a:schemeClr val="accent1"/>
+          </a:fillRef>
+          <a:effectRef idx="0">
+            <a:schemeClr val="accent1"/>
+          </a:effectRef>
+          <a:fontRef idx="minor">
+            <a:schemeClr val="tx1"/>
+          </a:fontRef>
+        </p:style>
+      </p:cxnSp>
+      <p:cxnSp>
+        <p:nvCxnSpPr>
+          <p:cNvPr id="41" name="Straight Connector 40">
+            <a:extLst>
+              <a:ext uri="{FF2B5EF4-FFF2-40B4-BE49-F238E27FC236}">
+                <a16:creationId xmlns:a16="http://schemas.microsoft.com/office/drawing/2014/main" id="{36D7CA8C-FF41-4341-BA1E-126DAC86E6A0}"/>
+              </a:ext>
+            </a:extLst>
+          </p:cNvPr>
+          <p:cNvCxnSpPr>
+            <a:cxnSpLocks/>
+            <a:stCxn id="22" idx="7"/>
+            <a:endCxn id="14" idx="3"/>
+          </p:cNvCxnSpPr>
+          <p:nvPr/>
+        </p:nvCxnSpPr>
+        <p:spPr>
+          <a:xfrm flipV="1">
+            <a:off x="3210781" y="1613972"/>
+            <a:ext cx="5413739" cy="3093260"/>
+          </a:xfrm>
+          <a:prstGeom prst="line">
+            <a:avLst/>
+          </a:prstGeom>
+          <a:ln w="38100">
+            <a:solidFill>
+              <a:schemeClr val="tx1"/>
+            </a:solidFill>
+          </a:ln>
+        </p:spPr>
+        <p:style>
+          <a:lnRef idx="1">
+            <a:schemeClr val="accent1"/>
+          </a:lnRef>
+          <a:fillRef idx="0">
+            <a:schemeClr val="accent1"/>
+          </a:fillRef>
+          <a:effectRef idx="0">
+            <a:schemeClr val="accent1"/>
+          </a:effectRef>
+          <a:fontRef idx="minor">
+            <a:schemeClr val="tx1"/>
+          </a:fontRef>
+        </p:style>
+      </p:cxnSp>
+      <p:sp>
+        <p:nvSpPr>
+          <p:cNvPr id="50" name="TextBox 49">
+            <a:extLst>
+              <a:ext uri="{FF2B5EF4-FFF2-40B4-BE49-F238E27FC236}">
+                <a16:creationId xmlns:a16="http://schemas.microsoft.com/office/drawing/2014/main" id="{E7370BB2-EB94-48CD-A3FC-3CC679AEE6FA}"/>
+              </a:ext>
+            </a:extLst>
+          </p:cNvPr>
+          <p:cNvSpPr txBox="1"/>
+          <p:nvPr/>
+        </p:nvSpPr>
+        <p:spPr>
+          <a:xfrm>
+            <a:off x="5794707" y="994071"/>
+            <a:ext cx="301686" cy="369332"/>
+          </a:xfrm>
+          <a:prstGeom prst="rect">
+            <a:avLst/>
+          </a:prstGeom>
+          <a:noFill/>
+        </p:spPr>
+        <p:txBody>
+          <a:bodyPr wrap="none" rtlCol="0">
+            <a:spAutoFit/>
+          </a:bodyPr>
+          <a:lstStyle/>
+          <a:p>
+            <a:r>
+              <a:rPr lang="en-US" dirty="0"/>
+              <a:t>6</a:t>
+            </a:r>
+          </a:p>
+        </p:txBody>
+      </p:sp>
+      <p:sp>
+        <p:nvSpPr>
+          <p:cNvPr id="60" name="TextBox 59">
+            <a:extLst>
+              <a:ext uri="{FF2B5EF4-FFF2-40B4-BE49-F238E27FC236}">
+                <a16:creationId xmlns:a16="http://schemas.microsoft.com/office/drawing/2014/main" id="{6B1EDC0D-3AB1-4845-B931-D32858A4279D}"/>
+              </a:ext>
+            </a:extLst>
+          </p:cNvPr>
+          <p:cNvSpPr txBox="1"/>
+          <p:nvPr/>
+        </p:nvSpPr>
+        <p:spPr>
+          <a:xfrm>
+            <a:off x="3077766" y="2904647"/>
+            <a:ext cx="301686" cy="369332"/>
+          </a:xfrm>
+          <a:prstGeom prst="rect">
+            <a:avLst/>
+          </a:prstGeom>
+          <a:noFill/>
+        </p:spPr>
+        <p:txBody>
+          <a:bodyPr wrap="none" rtlCol="0">
+            <a:spAutoFit/>
+          </a:bodyPr>
+          <a:lstStyle/>
+          <a:p>
+            <a:r>
+              <a:rPr lang="en-US" dirty="0"/>
+              <a:t>8</a:t>
+            </a:r>
+          </a:p>
+        </p:txBody>
+      </p:sp>
+      <p:sp>
+        <p:nvSpPr>
+          <p:cNvPr id="42" name="TextBox 41">
+            <a:extLst>
+              <a:ext uri="{FF2B5EF4-FFF2-40B4-BE49-F238E27FC236}">
+                <a16:creationId xmlns:a16="http://schemas.microsoft.com/office/drawing/2014/main" id="{76906B19-C0BD-48CE-BCF7-6EEB0CA2F7C1}"/>
+              </a:ext>
+            </a:extLst>
+          </p:cNvPr>
+          <p:cNvSpPr txBox="1"/>
+          <p:nvPr/>
+        </p:nvSpPr>
+        <p:spPr>
+          <a:xfrm>
+            <a:off x="5638219" y="2842749"/>
+            <a:ext cx="418704" cy="369332"/>
+          </a:xfrm>
+          <a:prstGeom prst="rect">
+            <a:avLst/>
+          </a:prstGeom>
+          <a:noFill/>
+        </p:spPr>
+        <p:txBody>
+          <a:bodyPr wrap="none" rtlCol="0">
+            <a:spAutoFit/>
+          </a:bodyPr>
+          <a:lstStyle/>
+          <a:p>
+            <a:r>
+              <a:rPr lang="en-US" dirty="0"/>
+              <a:t>12</a:t>
+            </a:r>
+          </a:p>
+        </p:txBody>
+      </p:sp>
+    </p:spTree>
+    <p:extLst>
+      <p:ext uri="{BB962C8B-B14F-4D97-AF65-F5344CB8AC3E}">
+        <p14:creationId xmlns:p14="http://schemas.microsoft.com/office/powerpoint/2010/main" val="3633125272"/>
+      </p:ext>
+    </p:extLst>
+  </p:cSld>
+  <p:clrMapOvr>
+    <a:masterClrMapping/>
+  </p:clrMapOvr>
+</p:sld>
+</file>
+
+<file path=ppt/slides/slide5.xml><?xml version="1.0" encoding="utf-8"?>
+<p:sld xmlns:a="http://schemas.openxmlformats.org/drawingml/2006/main" xmlns:r="http://schemas.openxmlformats.org/officeDocument/2006/relationships" xmlns:p="http://schemas.openxmlformats.org/presentationml/2006/main">
+  <p:cSld>
+    <p:spTree>
+      <p:nvGrpSpPr>
+        <p:cNvPr id="1" name=""/>
+        <p:cNvGrpSpPr/>
+        <p:nvPr/>
+      </p:nvGrpSpPr>
+      <p:grpSpPr>
+        <a:xfrm>
+          <a:off x="0" y="0"/>
+          <a:ext cx="0" cy="0"/>
+          <a:chOff x="0" y="0"/>
+          <a:chExt cx="0" cy="0"/>
+        </a:xfrm>
+      </p:grpSpPr>
+      <p:sp>
+        <p:nvSpPr>
+          <p:cNvPr id="2" name="Oval 1">
+            <a:extLst>
+              <a:ext uri="{FF2B5EF4-FFF2-40B4-BE49-F238E27FC236}">
+                <a16:creationId xmlns:a16="http://schemas.microsoft.com/office/drawing/2014/main" id="{8149D9A1-4580-48C3-92A0-3C20B034CD93}"/>
+              </a:ext>
+            </a:extLst>
+          </p:cNvPr>
+          <p:cNvSpPr/>
+          <p:nvPr/>
+        </p:nvSpPr>
+        <p:spPr>
+          <a:xfrm>
+            <a:off x="2509934" y="961052"/>
+            <a:ext cx="821095" cy="807634"/>
+          </a:xfrm>
+          <a:prstGeom prst="ellipse">
+            <a:avLst/>
+          </a:prstGeom>
+          <a:noFill/>
+          <a:ln w="38100">
+            <a:solidFill>
+              <a:schemeClr val="tx1"/>
+            </a:solidFill>
+          </a:ln>
+        </p:spPr>
+        <p:style>
+          <a:lnRef idx="2">
+            <a:schemeClr val="accent1">
+              <a:shade val="50000"/>
+            </a:schemeClr>
+          </a:lnRef>
+          <a:fillRef idx="1">
+            <a:schemeClr val="accent1"/>
+          </a:fillRef>
+          <a:effectRef idx="0">
+            <a:schemeClr val="accent1"/>
+          </a:effectRef>
+          <a:fontRef idx="minor">
+            <a:schemeClr val="lt1"/>
+          </a:fontRef>
+        </p:style>
+        <p:txBody>
+          <a:bodyPr rtlCol="0" anchor="ctr"/>
+          <a:lstStyle/>
+          <a:p>
+            <a:pPr algn="ctr"/>
+            <a:r>
+              <a:rPr lang="en-US" dirty="0">
+                <a:solidFill>
+                  <a:schemeClr val="tx1"/>
+                </a:solidFill>
+              </a:rPr>
+              <a:t>A</a:t>
+            </a:r>
+          </a:p>
+        </p:txBody>
+      </p:sp>
+      <p:sp>
+        <p:nvSpPr>
+          <p:cNvPr id="14" name="Oval 13">
+            <a:extLst>
+              <a:ext uri="{FF2B5EF4-FFF2-40B4-BE49-F238E27FC236}">
+                <a16:creationId xmlns:a16="http://schemas.microsoft.com/office/drawing/2014/main" id="{FD26DF91-AA5B-41C9-98B8-1E1FE5DA81A4}"/>
+              </a:ext>
+            </a:extLst>
+          </p:cNvPr>
+          <p:cNvSpPr/>
+          <p:nvPr/>
+        </p:nvSpPr>
+        <p:spPr>
+          <a:xfrm>
+            <a:off x="8504273" y="924613"/>
+            <a:ext cx="821095" cy="807634"/>
+          </a:xfrm>
+          <a:prstGeom prst="ellipse">
+            <a:avLst/>
+          </a:prstGeom>
+          <a:noFill/>
+          <a:ln w="38100">
+            <a:solidFill>
+              <a:schemeClr val="tx1"/>
+            </a:solidFill>
+          </a:ln>
+        </p:spPr>
+        <p:style>
+          <a:lnRef idx="2">
+            <a:schemeClr val="accent1">
+              <a:shade val="50000"/>
+            </a:schemeClr>
+          </a:lnRef>
+          <a:fillRef idx="1">
+            <a:schemeClr val="accent1"/>
+          </a:fillRef>
+          <a:effectRef idx="0">
+            <a:schemeClr val="accent1"/>
+          </a:effectRef>
+          <a:fontRef idx="minor">
+            <a:schemeClr val="lt1"/>
+          </a:fontRef>
+        </p:style>
+        <p:txBody>
+          <a:bodyPr rtlCol="0" anchor="ctr"/>
+          <a:lstStyle/>
+          <a:p>
+            <a:pPr algn="ctr"/>
+            <a:r>
+              <a:rPr lang="en-US" dirty="0">
+                <a:solidFill>
+                  <a:schemeClr val="tx1"/>
+                </a:solidFill>
+              </a:rPr>
+              <a:t>C</a:t>
+            </a:r>
+          </a:p>
+        </p:txBody>
+      </p:sp>
+      <p:sp>
+        <p:nvSpPr>
+          <p:cNvPr id="22" name="Oval 21">
+            <a:extLst>
+              <a:ext uri="{FF2B5EF4-FFF2-40B4-BE49-F238E27FC236}">
+                <a16:creationId xmlns:a16="http://schemas.microsoft.com/office/drawing/2014/main" id="{B310E9A9-DCE9-437B-9921-22DBF9CBE2FB}"/>
+              </a:ext>
+            </a:extLst>
+          </p:cNvPr>
+          <p:cNvSpPr/>
+          <p:nvPr/>
+        </p:nvSpPr>
+        <p:spPr>
+          <a:xfrm>
+            <a:off x="2509933" y="4588957"/>
+            <a:ext cx="821095" cy="807634"/>
+          </a:xfrm>
+          <a:prstGeom prst="ellipse">
+            <a:avLst/>
+          </a:prstGeom>
+          <a:noFill/>
+          <a:ln w="38100">
+            <a:solidFill>
+              <a:schemeClr val="tx1"/>
+            </a:solidFill>
+          </a:ln>
+        </p:spPr>
+        <p:style>
+          <a:lnRef idx="2">
+            <a:schemeClr val="accent1">
+              <a:shade val="50000"/>
+            </a:schemeClr>
+          </a:lnRef>
+          <a:fillRef idx="1">
+            <a:schemeClr val="accent1"/>
+          </a:fillRef>
+          <a:effectRef idx="0">
+            <a:schemeClr val="accent1"/>
+          </a:effectRef>
+          <a:fontRef idx="minor">
+            <a:schemeClr val="lt1"/>
+          </a:fontRef>
+        </p:style>
+        <p:txBody>
+          <a:bodyPr rtlCol="0" anchor="ctr"/>
+          <a:lstStyle/>
+          <a:p>
+            <a:pPr algn="ctr"/>
+            <a:r>
+              <a:rPr lang="en-US" dirty="0">
+                <a:solidFill>
+                  <a:schemeClr val="tx1"/>
+                </a:solidFill>
+              </a:rPr>
+              <a:t>G</a:t>
+            </a:r>
+          </a:p>
+        </p:txBody>
+      </p:sp>
+      <p:cxnSp>
+        <p:nvCxnSpPr>
+          <p:cNvPr id="25" name="Straight Connector 24">
+            <a:extLst>
+              <a:ext uri="{FF2B5EF4-FFF2-40B4-BE49-F238E27FC236}">
+                <a16:creationId xmlns:a16="http://schemas.microsoft.com/office/drawing/2014/main" id="{0C8EFA75-D242-4B4E-835D-7CB8F386D482}"/>
+              </a:ext>
+            </a:extLst>
+          </p:cNvPr>
+          <p:cNvCxnSpPr>
+            <a:cxnSpLocks/>
+            <a:stCxn id="14" idx="2"/>
+          </p:cNvCxnSpPr>
+          <p:nvPr/>
+        </p:nvCxnSpPr>
+        <p:spPr>
+          <a:xfrm flipH="1">
+            <a:off x="3331029" y="1328430"/>
+            <a:ext cx="5173244" cy="17242"/>
+          </a:xfrm>
+          <a:prstGeom prst="line">
+            <a:avLst/>
+          </a:prstGeom>
+          <a:ln w="38100">
+            <a:solidFill>
+              <a:schemeClr val="tx1"/>
+            </a:solidFill>
+          </a:ln>
+        </p:spPr>
+        <p:style>
+          <a:lnRef idx="1">
+            <a:schemeClr val="accent1"/>
+          </a:lnRef>
+          <a:fillRef idx="0">
+            <a:schemeClr val="accent1"/>
+          </a:fillRef>
+          <a:effectRef idx="0">
+            <a:schemeClr val="accent1"/>
+          </a:effectRef>
+          <a:fontRef idx="minor">
+            <a:schemeClr val="tx1"/>
+          </a:fontRef>
+        </p:style>
+      </p:cxnSp>
+      <p:cxnSp>
+        <p:nvCxnSpPr>
+          <p:cNvPr id="31" name="Straight Connector 30">
+            <a:extLst>
+              <a:ext uri="{FF2B5EF4-FFF2-40B4-BE49-F238E27FC236}">
+                <a16:creationId xmlns:a16="http://schemas.microsoft.com/office/drawing/2014/main" id="{BFEF5EF6-2408-4DD0-8030-FA0AC36BC642}"/>
+              </a:ext>
+            </a:extLst>
+          </p:cNvPr>
+          <p:cNvCxnSpPr>
+            <a:cxnSpLocks/>
+            <a:stCxn id="22" idx="0"/>
+          </p:cNvCxnSpPr>
+          <p:nvPr/>
+        </p:nvCxnSpPr>
+        <p:spPr>
+          <a:xfrm flipH="1" flipV="1">
+            <a:off x="2920480" y="2528596"/>
+            <a:ext cx="1" cy="2060361"/>
+          </a:xfrm>
+          <a:prstGeom prst="line">
+            <a:avLst/>
+          </a:prstGeom>
+          <a:ln w="38100">
+            <a:solidFill>
+              <a:schemeClr val="tx1"/>
+            </a:solidFill>
+          </a:ln>
+        </p:spPr>
+        <p:style>
+          <a:lnRef idx="1">
+            <a:schemeClr val="accent1"/>
+          </a:lnRef>
+          <a:fillRef idx="0">
+            <a:schemeClr val="accent1"/>
+          </a:fillRef>
+          <a:effectRef idx="0">
+            <a:schemeClr val="accent1"/>
+          </a:effectRef>
+          <a:fontRef idx="minor">
+            <a:schemeClr val="tx1"/>
+          </a:fontRef>
+        </p:style>
+      </p:cxnSp>
+      <p:cxnSp>
+        <p:nvCxnSpPr>
+          <p:cNvPr id="32" name="Straight Connector 31">
+            <a:extLst>
+              <a:ext uri="{FF2B5EF4-FFF2-40B4-BE49-F238E27FC236}">
+                <a16:creationId xmlns:a16="http://schemas.microsoft.com/office/drawing/2014/main" id="{20B610F1-5962-4AF1-93BF-427AF6AAD489}"/>
+              </a:ext>
+            </a:extLst>
+          </p:cNvPr>
+          <p:cNvCxnSpPr>
+            <a:cxnSpLocks/>
+            <a:endCxn id="2" idx="4"/>
+          </p:cNvCxnSpPr>
+          <p:nvPr/>
+        </p:nvCxnSpPr>
+        <p:spPr>
+          <a:xfrm flipV="1">
+            <a:off x="2920480" y="1768686"/>
+            <a:ext cx="2" cy="962222"/>
+          </a:xfrm>
+          <a:prstGeom prst="line">
+            <a:avLst/>
+          </a:prstGeom>
+          <a:ln w="38100">
+            <a:solidFill>
+              <a:schemeClr val="tx1"/>
+            </a:solidFill>
+          </a:ln>
+        </p:spPr>
+        <p:style>
+          <a:lnRef idx="1">
+            <a:schemeClr val="accent1"/>
+          </a:lnRef>
+          <a:fillRef idx="0">
+            <a:schemeClr val="accent1"/>
+          </a:fillRef>
+          <a:effectRef idx="0">
+            <a:schemeClr val="accent1"/>
+          </a:effectRef>
+          <a:fontRef idx="minor">
+            <a:schemeClr val="tx1"/>
+          </a:fontRef>
+        </p:style>
+      </p:cxnSp>
+      <p:sp>
+        <p:nvSpPr>
+          <p:cNvPr id="50" name="TextBox 49">
+            <a:extLst>
+              <a:ext uri="{FF2B5EF4-FFF2-40B4-BE49-F238E27FC236}">
+                <a16:creationId xmlns:a16="http://schemas.microsoft.com/office/drawing/2014/main" id="{E7370BB2-EB94-48CD-A3FC-3CC679AEE6FA}"/>
+              </a:ext>
+            </a:extLst>
+          </p:cNvPr>
+          <p:cNvSpPr txBox="1"/>
+          <p:nvPr/>
+        </p:nvSpPr>
+        <p:spPr>
+          <a:xfrm>
+            <a:off x="5794707" y="994071"/>
+            <a:ext cx="301686" cy="369332"/>
+          </a:xfrm>
+          <a:prstGeom prst="rect">
+            <a:avLst/>
+          </a:prstGeom>
+          <a:noFill/>
+        </p:spPr>
+        <p:txBody>
+          <a:bodyPr wrap="none" rtlCol="0">
+            <a:spAutoFit/>
+          </a:bodyPr>
+          <a:lstStyle/>
+          <a:p>
+            <a:r>
+              <a:rPr lang="en-US" dirty="0"/>
+              <a:t>6</a:t>
+            </a:r>
+          </a:p>
+        </p:txBody>
+      </p:sp>
+      <p:sp>
+        <p:nvSpPr>
+          <p:cNvPr id="60" name="TextBox 59">
+            <a:extLst>
+              <a:ext uri="{FF2B5EF4-FFF2-40B4-BE49-F238E27FC236}">
+                <a16:creationId xmlns:a16="http://schemas.microsoft.com/office/drawing/2014/main" id="{6B1EDC0D-3AB1-4845-B931-D32858A4279D}"/>
+              </a:ext>
+            </a:extLst>
+          </p:cNvPr>
+          <p:cNvSpPr txBox="1"/>
+          <p:nvPr/>
+        </p:nvSpPr>
+        <p:spPr>
+          <a:xfrm>
+            <a:off x="3077766" y="2904647"/>
+            <a:ext cx="301686" cy="369332"/>
+          </a:xfrm>
+          <a:prstGeom prst="rect">
+            <a:avLst/>
+          </a:prstGeom>
+          <a:noFill/>
+        </p:spPr>
+        <p:txBody>
+          <a:bodyPr wrap="none" rtlCol="0">
+            <a:spAutoFit/>
+          </a:bodyPr>
+          <a:lstStyle/>
+          <a:p>
+            <a:r>
+              <a:rPr lang="en-US" dirty="0"/>
+              <a:t>8</a:t>
+            </a:r>
+          </a:p>
+        </p:txBody>
+      </p:sp>
+    </p:spTree>
+    <p:extLst>
+      <p:ext uri="{BB962C8B-B14F-4D97-AF65-F5344CB8AC3E}">
+        <p14:creationId xmlns:p14="http://schemas.microsoft.com/office/powerpoint/2010/main" val="2772182986"/>
       </p:ext>
     </p:extLst>
   </p:cSld>

</xml_diff>

<commit_message>
updated input files to be CSV correct.
</commit_message>
<xml_diff>
--- a/homework/pa3/maps.pptx
+++ b/homework/pa3/maps.pptx
@@ -108,6 +108,11 @@
       </a:defRPr>
     </a:lvl9pPr>
   </p:defaultTextStyle>
+  <p:extLst>
+    <p:ext uri="{EFAFB233-063F-42B5-8137-9DF3F51BA10A}">
+      <p15:sldGuideLst xmlns:p15="http://schemas.microsoft.com/office/powerpoint/2012/main"/>
+    </p:ext>
+  </p:extLst>
 </p:presentation>
 </file>
 
@@ -258,7 +263,7 @@
           <a:p>
             <a:fld id="{C97B4ADE-B371-4585-952D-D076B348D712}" type="datetimeFigureOut">
               <a:rPr lang="en-US" smtClean="0"/>
-              <a:t>2/24/2019</a:t>
+              <a:t>2/25/2019</a:t>
             </a:fld>
             <a:endParaRPr lang="en-US"/>
           </a:p>
@@ -456,7 +461,7 @@
           <a:p>
             <a:fld id="{C97B4ADE-B371-4585-952D-D076B348D712}" type="datetimeFigureOut">
               <a:rPr lang="en-US" smtClean="0"/>
-              <a:t>2/24/2019</a:t>
+              <a:t>2/25/2019</a:t>
             </a:fld>
             <a:endParaRPr lang="en-US"/>
           </a:p>
@@ -664,7 +669,7 @@
           <a:p>
             <a:fld id="{C97B4ADE-B371-4585-952D-D076B348D712}" type="datetimeFigureOut">
               <a:rPr lang="en-US" smtClean="0"/>
-              <a:t>2/24/2019</a:t>
+              <a:t>2/25/2019</a:t>
             </a:fld>
             <a:endParaRPr lang="en-US"/>
           </a:p>
@@ -862,7 +867,7 @@
           <a:p>
             <a:fld id="{C97B4ADE-B371-4585-952D-D076B348D712}" type="datetimeFigureOut">
               <a:rPr lang="en-US" smtClean="0"/>
-              <a:t>2/24/2019</a:t>
+              <a:t>2/25/2019</a:t>
             </a:fld>
             <a:endParaRPr lang="en-US"/>
           </a:p>
@@ -1137,7 +1142,7 @@
           <a:p>
             <a:fld id="{C97B4ADE-B371-4585-952D-D076B348D712}" type="datetimeFigureOut">
               <a:rPr lang="en-US" smtClean="0"/>
-              <a:t>2/24/2019</a:t>
+              <a:t>2/25/2019</a:t>
             </a:fld>
             <a:endParaRPr lang="en-US"/>
           </a:p>
@@ -1402,7 +1407,7 @@
           <a:p>
             <a:fld id="{C97B4ADE-B371-4585-952D-D076B348D712}" type="datetimeFigureOut">
               <a:rPr lang="en-US" smtClean="0"/>
-              <a:t>2/24/2019</a:t>
+              <a:t>2/25/2019</a:t>
             </a:fld>
             <a:endParaRPr lang="en-US"/>
           </a:p>
@@ -1814,7 +1819,7 @@
           <a:p>
             <a:fld id="{C97B4ADE-B371-4585-952D-D076B348D712}" type="datetimeFigureOut">
               <a:rPr lang="en-US" smtClean="0"/>
-              <a:t>2/24/2019</a:t>
+              <a:t>2/25/2019</a:t>
             </a:fld>
             <a:endParaRPr lang="en-US"/>
           </a:p>
@@ -1955,7 +1960,7 @@
           <a:p>
             <a:fld id="{C97B4ADE-B371-4585-952D-D076B348D712}" type="datetimeFigureOut">
               <a:rPr lang="en-US" smtClean="0"/>
-              <a:t>2/24/2019</a:t>
+              <a:t>2/25/2019</a:t>
             </a:fld>
             <a:endParaRPr lang="en-US"/>
           </a:p>
@@ -2068,7 +2073,7 @@
           <a:p>
             <a:fld id="{C97B4ADE-B371-4585-952D-D076B348D712}" type="datetimeFigureOut">
               <a:rPr lang="en-US" smtClean="0"/>
-              <a:t>2/24/2019</a:t>
+              <a:t>2/25/2019</a:t>
             </a:fld>
             <a:endParaRPr lang="en-US"/>
           </a:p>
@@ -2379,7 +2384,7 @@
           <a:p>
             <a:fld id="{C97B4ADE-B371-4585-952D-D076B348D712}" type="datetimeFigureOut">
               <a:rPr lang="en-US" smtClean="0"/>
-              <a:t>2/24/2019</a:t>
+              <a:t>2/25/2019</a:t>
             </a:fld>
             <a:endParaRPr lang="en-US"/>
           </a:p>
@@ -2667,7 +2672,7 @@
           <a:p>
             <a:fld id="{C97B4ADE-B371-4585-952D-D076B348D712}" type="datetimeFigureOut">
               <a:rPr lang="en-US" smtClean="0"/>
-              <a:t>2/24/2019</a:t>
+              <a:t>2/25/2019</a:t>
             </a:fld>
             <a:endParaRPr lang="en-US"/>
           </a:p>
@@ -2908,7 +2913,7 @@
           <a:p>
             <a:fld id="{C97B4ADE-B371-4585-952D-D076B348D712}" type="datetimeFigureOut">
               <a:rPr lang="en-US" smtClean="0"/>
-              <a:t>2/24/2019</a:t>
+              <a:t>2/25/2019</a:t>
             </a:fld>
             <a:endParaRPr lang="en-US"/>
           </a:p>
@@ -6191,49 +6196,6 @@
       </p:cxnSp>
       <p:cxnSp>
         <p:nvCxnSpPr>
-          <p:cNvPr id="30" name="Straight Connector 29">
-            <a:extLst>
-              <a:ext uri="{FF2B5EF4-FFF2-40B4-BE49-F238E27FC236}">
-                <a16:creationId xmlns:a16="http://schemas.microsoft.com/office/drawing/2014/main" id="{9A4CACE5-89D5-4DF8-9D74-7F86F9F23EB7}"/>
-              </a:ext>
-            </a:extLst>
-          </p:cNvPr>
-          <p:cNvCxnSpPr>
-            <a:cxnSpLocks/>
-          </p:cNvCxnSpPr>
-          <p:nvPr/>
-        </p:nvCxnSpPr>
-        <p:spPr>
-          <a:xfrm flipH="1">
-            <a:off x="3331028" y="5048396"/>
-            <a:ext cx="2047490" cy="17242"/>
-          </a:xfrm>
-          <a:prstGeom prst="line">
-            <a:avLst/>
-          </a:prstGeom>
-          <a:ln w="38100">
-            <a:solidFill>
-              <a:schemeClr val="tx1"/>
-            </a:solidFill>
-          </a:ln>
-        </p:spPr>
-        <p:style>
-          <a:lnRef idx="1">
-            <a:schemeClr val="accent1"/>
-          </a:lnRef>
-          <a:fillRef idx="0">
-            <a:schemeClr val="accent1"/>
-          </a:fillRef>
-          <a:effectRef idx="0">
-            <a:schemeClr val="accent1"/>
-          </a:effectRef>
-          <a:fontRef idx="minor">
-            <a:schemeClr val="tx1"/>
-          </a:fontRef>
-        </p:style>
-      </p:cxnSp>
-      <p:cxnSp>
-        <p:nvCxnSpPr>
           <p:cNvPr id="31" name="Straight Connector 30">
             <a:extLst>
               <a:ext uri="{FF2B5EF4-FFF2-40B4-BE49-F238E27FC236}">
@@ -6773,41 +6735,6 @@
             <a:r>
               <a:rPr lang="en-US" dirty="0"/>
               <a:t>3</a:t>
-            </a:r>
-          </a:p>
-        </p:txBody>
-      </p:sp>
-      <p:sp>
-        <p:nvSpPr>
-          <p:cNvPr id="62" name="TextBox 61">
-            <a:extLst>
-              <a:ext uri="{FF2B5EF4-FFF2-40B4-BE49-F238E27FC236}">
-                <a16:creationId xmlns:a16="http://schemas.microsoft.com/office/drawing/2014/main" id="{D5616115-D377-40CC-BB32-1CEBF8251502}"/>
-              </a:ext>
-            </a:extLst>
-          </p:cNvPr>
-          <p:cNvSpPr txBox="1"/>
-          <p:nvPr/>
-        </p:nvSpPr>
-        <p:spPr>
-          <a:xfrm>
-            <a:off x="4585240" y="4707232"/>
-            <a:ext cx="301686" cy="369332"/>
-          </a:xfrm>
-          <a:prstGeom prst="rect">
-            <a:avLst/>
-          </a:prstGeom>
-          <a:noFill/>
-        </p:spPr>
-        <p:txBody>
-          <a:bodyPr wrap="none" rtlCol="0">
-            <a:spAutoFit/>
-          </a:bodyPr>
-          <a:lstStyle/>
-          <a:p>
-            <a:r>
-              <a:rPr lang="en-US" dirty="0"/>
-              <a:t>5</a:t>
             </a:r>
           </a:p>
         </p:txBody>

</xml_diff>